<commit_message>
finished customer situation (minus images)
</commit_message>
<xml_diff>
--- a/Whiteboard design session/WDS trainer presentation - Title xxx.pptx
+++ b/Whiteboard design session/WDS trainer presentation - Title xxx.pptx
@@ -6,7 +6,7 @@
     <p:sldMasterId id="2147483665" r:id="rId5"/>
   </p:sldMasterIdLst>
   <p:notesMasterIdLst>
-    <p:notesMasterId r:id="rId33"/>
+    <p:notesMasterId r:id="rId34"/>
   </p:notesMasterIdLst>
   <p:sldIdLst>
     <p:sldId id="300" r:id="rId6"/>
@@ -16,26 +16,27 @@
     <p:sldId id="324" r:id="rId10"/>
     <p:sldId id="325" r:id="rId11"/>
     <p:sldId id="326" r:id="rId12"/>
-    <p:sldId id="303" r:id="rId13"/>
-    <p:sldId id="304" r:id="rId14"/>
-    <p:sldId id="305" r:id="rId15"/>
-    <p:sldId id="320" r:id="rId16"/>
-    <p:sldId id="322" r:id="rId17"/>
-    <p:sldId id="321" r:id="rId18"/>
-    <p:sldId id="317" r:id="rId19"/>
-    <p:sldId id="316" r:id="rId20"/>
-    <p:sldId id="319" r:id="rId21"/>
-    <p:sldId id="318" r:id="rId22"/>
-    <p:sldId id="315" r:id="rId23"/>
-    <p:sldId id="306" r:id="rId24"/>
-    <p:sldId id="307" r:id="rId25"/>
-    <p:sldId id="308" r:id="rId26"/>
-    <p:sldId id="309" r:id="rId27"/>
-    <p:sldId id="310" r:id="rId28"/>
-    <p:sldId id="311" r:id="rId29"/>
-    <p:sldId id="312" r:id="rId30"/>
-    <p:sldId id="313" r:id="rId31"/>
-    <p:sldId id="314" r:id="rId32"/>
+    <p:sldId id="327" r:id="rId13"/>
+    <p:sldId id="303" r:id="rId14"/>
+    <p:sldId id="304" r:id="rId15"/>
+    <p:sldId id="305" r:id="rId16"/>
+    <p:sldId id="320" r:id="rId17"/>
+    <p:sldId id="322" r:id="rId18"/>
+    <p:sldId id="321" r:id="rId19"/>
+    <p:sldId id="317" r:id="rId20"/>
+    <p:sldId id="316" r:id="rId21"/>
+    <p:sldId id="319" r:id="rId22"/>
+    <p:sldId id="318" r:id="rId23"/>
+    <p:sldId id="315" r:id="rId24"/>
+    <p:sldId id="306" r:id="rId25"/>
+    <p:sldId id="307" r:id="rId26"/>
+    <p:sldId id="308" r:id="rId27"/>
+    <p:sldId id="309" r:id="rId28"/>
+    <p:sldId id="310" r:id="rId29"/>
+    <p:sldId id="311" r:id="rId30"/>
+    <p:sldId id="312" r:id="rId31"/>
+    <p:sldId id="313" r:id="rId32"/>
+    <p:sldId id="314" r:id="rId33"/>
   </p:sldIdLst>
   <p:sldSz cx="12192000" cy="6858000"/>
   <p:notesSz cx="6858000" cy="9144000"/>
@@ -718,7 +719,7 @@
     </p:spTree>
     <p:extLst>
       <p:ext uri="{BB962C8B-B14F-4D97-AF65-F5344CB8AC3E}">
-        <p14:creationId xmlns:p14="http://schemas.microsoft.com/office/powerpoint/2010/main" val="1267405105"/>
+        <p14:creationId xmlns:p14="http://schemas.microsoft.com/office/powerpoint/2010/main" val="1669752691"/>
       </p:ext>
     </p:extLst>
   </p:cSld>
@@ -772,7 +773,7 @@
           <a:bodyPr/>
           <a:lstStyle/>
           <a:p>
-            <a:endParaRPr lang="en-US" dirty="0"/>
+            <a:endParaRPr lang="en-US"/>
           </a:p>
         </p:txBody>
       </p:sp>
@@ -802,7 +803,7 @@
     </p:spTree>
     <p:extLst>
       <p:ext uri="{BB962C8B-B14F-4D97-AF65-F5344CB8AC3E}">
-        <p14:creationId xmlns:p14="http://schemas.microsoft.com/office/powerpoint/2010/main" val="3229744285"/>
+        <p14:creationId xmlns:p14="http://schemas.microsoft.com/office/powerpoint/2010/main" val="1267405105"/>
       </p:ext>
     </p:extLst>
   </p:cSld>
@@ -886,7 +887,7 @@
     </p:spTree>
     <p:extLst>
       <p:ext uri="{BB962C8B-B14F-4D97-AF65-F5344CB8AC3E}">
-        <p14:creationId xmlns:p14="http://schemas.microsoft.com/office/powerpoint/2010/main" val="251902611"/>
+        <p14:creationId xmlns:p14="http://schemas.microsoft.com/office/powerpoint/2010/main" val="3229744285"/>
       </p:ext>
     </p:extLst>
   </p:cSld>
@@ -970,7 +971,7 @@
     </p:spTree>
     <p:extLst>
       <p:ext uri="{BB962C8B-B14F-4D97-AF65-F5344CB8AC3E}">
-        <p14:creationId xmlns:p14="http://schemas.microsoft.com/office/powerpoint/2010/main" val="1579283386"/>
+        <p14:creationId xmlns:p14="http://schemas.microsoft.com/office/powerpoint/2010/main" val="251902611"/>
       </p:ext>
     </p:extLst>
   </p:cSld>
@@ -1024,7 +1025,7 @@
           <a:bodyPr/>
           <a:lstStyle/>
           <a:p>
-            <a:endParaRPr lang="en-US"/>
+            <a:endParaRPr lang="en-US" dirty="0"/>
           </a:p>
         </p:txBody>
       </p:sp>
@@ -1054,7 +1055,7 @@
     </p:spTree>
     <p:extLst>
       <p:ext uri="{BB962C8B-B14F-4D97-AF65-F5344CB8AC3E}">
-        <p14:creationId xmlns:p14="http://schemas.microsoft.com/office/powerpoint/2010/main" val="647674203"/>
+        <p14:creationId xmlns:p14="http://schemas.microsoft.com/office/powerpoint/2010/main" val="1579283386"/>
       </p:ext>
     </p:extLst>
   </p:cSld>
@@ -1138,7 +1139,7 @@
     </p:spTree>
     <p:extLst>
       <p:ext uri="{BB962C8B-B14F-4D97-AF65-F5344CB8AC3E}">
-        <p14:creationId xmlns:p14="http://schemas.microsoft.com/office/powerpoint/2010/main" val="4179281765"/>
+        <p14:creationId xmlns:p14="http://schemas.microsoft.com/office/powerpoint/2010/main" val="647674203"/>
       </p:ext>
     </p:extLst>
   </p:cSld>
@@ -1222,7 +1223,7 @@
     </p:spTree>
     <p:extLst>
       <p:ext uri="{BB962C8B-B14F-4D97-AF65-F5344CB8AC3E}">
-        <p14:creationId xmlns:p14="http://schemas.microsoft.com/office/powerpoint/2010/main" val="4115832635"/>
+        <p14:creationId xmlns:p14="http://schemas.microsoft.com/office/powerpoint/2010/main" val="4179281765"/>
       </p:ext>
     </p:extLst>
   </p:cSld>
@@ -1306,7 +1307,7 @@
     </p:spTree>
     <p:extLst>
       <p:ext uri="{BB962C8B-B14F-4D97-AF65-F5344CB8AC3E}">
-        <p14:creationId xmlns:p14="http://schemas.microsoft.com/office/powerpoint/2010/main" val="671285550"/>
+        <p14:creationId xmlns:p14="http://schemas.microsoft.com/office/powerpoint/2010/main" val="4115832635"/>
       </p:ext>
     </p:extLst>
   </p:cSld>
@@ -1343,12 +1344,7 @@
             <p:ph type="sldImg"/>
           </p:nvPr>
         </p:nvSpPr>
-        <p:spPr>
-          <a:xfrm>
-            <a:off x="381000" y="685800"/>
-            <a:ext cx="6096000" cy="3429000"/>
-          </a:xfrm>
-        </p:spPr>
+        <p:spPr/>
       </p:sp>
       <p:sp>
         <p:nvSpPr>
@@ -1358,58 +1354,6 @@
           </p:cNvSpPr>
           <p:nvPr>
             <p:ph type="body" idx="1"/>
-          </p:nvPr>
-        </p:nvSpPr>
-        <p:spPr/>
-        <p:txBody>
-          <a:bodyPr>
-            <a:normAutofit/>
-          </a:bodyPr>
-          <a:lstStyle/>
-          <a:p>
-            <a:endParaRPr lang="en-US" dirty="0"/>
-          </a:p>
-        </p:txBody>
-      </p:sp>
-      <p:sp>
-        <p:nvSpPr>
-          <p:cNvPr id="4" name="Header Placeholder 3"/>
-          <p:cNvSpPr>
-            <a:spLocks noGrp="1"/>
-          </p:cNvSpPr>
-          <p:nvPr>
-            <p:ph type="hdr" sz="quarter" idx="10"/>
-          </p:nvPr>
-        </p:nvSpPr>
-        <p:spPr>
-          <a:xfrm>
-            <a:off x="0" y="0"/>
-            <a:ext cx="2971800" cy="457200"/>
-          </a:xfrm>
-          <a:prstGeom prst="rect">
-            <a:avLst/>
-          </a:prstGeom>
-        </p:spPr>
-        <p:txBody>
-          <a:bodyPr/>
-          <a:lstStyle/>
-          <a:p>
-            <a:endParaRPr lang="en-US" dirty="0">
-              <a:solidFill>
-                <a:prstClr val="black"/>
-              </a:solidFill>
-            </a:endParaRPr>
-          </a:p>
-        </p:txBody>
-      </p:sp>
-      <p:sp>
-        <p:nvSpPr>
-          <p:cNvPr id="5" name="Date Placeholder 4"/>
-          <p:cNvSpPr>
-            <a:spLocks noGrp="1"/>
-          </p:cNvSpPr>
-          <p:nvPr>
-            <p:ph type="dt" idx="11"/>
           </p:nvPr>
         </p:nvSpPr>
         <p:spPr/>
@@ -1417,30 +1361,18 @@
           <a:bodyPr/>
           <a:lstStyle/>
           <a:p>
-            <a:fld id="{8AB9A6D4-FB34-4BDB-BA1E-7271914431FC}" type="datetime8">
-              <a:rPr lang="en-US" smtClean="0">
-                <a:solidFill>
-                  <a:prstClr val="black"/>
-                </a:solidFill>
-              </a:rPr>
-              <a:t>3/28/2020 4:25 PM</a:t>
-            </a:fld>
-            <a:endParaRPr lang="en-US" dirty="0">
-              <a:solidFill>
-                <a:prstClr val="black"/>
-              </a:solidFill>
-            </a:endParaRPr>
+            <a:endParaRPr lang="en-US"/>
           </a:p>
         </p:txBody>
       </p:sp>
       <p:sp>
         <p:nvSpPr>
-          <p:cNvPr id="7" name="Slide Number Placeholder 6"/>
+          <p:cNvPr id="4" name="Slide Number Placeholder 3"/>
           <p:cNvSpPr>
             <a:spLocks noGrp="1"/>
           </p:cNvSpPr>
           <p:nvPr>
-            <p:ph type="sldNum" sz="quarter" idx="13"/>
+            <p:ph type="sldNum" sz="quarter" idx="10"/>
           </p:nvPr>
         </p:nvSpPr>
         <p:spPr/>
@@ -1448,81 +1380,18 @@
           <a:bodyPr/>
           <a:lstStyle/>
           <a:p>
-            <a:fld id="{EC87E0CF-87F6-4B58-B8B8-DCAB2DAAF3CA}" type="slidenum">
-              <a:rPr lang="en-US" smtClean="0">
-                <a:solidFill>
-                  <a:prstClr val="black"/>
-                </a:solidFill>
-              </a:rPr>
-              <a:pPr/>
+            <a:fld id="{0998D5BB-B127-481F-BC0A-2F77C576BB34}" type="slidenum">
+              <a:rPr lang="en-US" smtClean="0"/>
               <a:t>18</a:t>
             </a:fld>
-            <a:endParaRPr lang="en-US" dirty="0">
-              <a:solidFill>
-                <a:prstClr val="black"/>
-              </a:solidFill>
-            </a:endParaRPr>
-          </a:p>
-        </p:txBody>
-      </p:sp>
-      <p:sp>
-        <p:nvSpPr>
-          <p:cNvPr id="6" name="Footer Placeholder 5"/>
-          <p:cNvSpPr>
-            <a:spLocks noGrp="1"/>
-          </p:cNvSpPr>
-          <p:nvPr>
-            <p:ph type="ftr" sz="quarter" idx="14"/>
-          </p:nvPr>
-        </p:nvSpPr>
-        <p:spPr/>
-        <p:txBody>
-          <a:bodyPr/>
-          <a:lstStyle/>
-          <a:p>
-            <a:pPr defTabSz="914099" eaLnBrk="0" hangingPunct="0"/>
-            <a:r>
-              <a:rPr lang="en-US" sz="400">
-                <a:gradFill>
-                  <a:gsLst>
-                    <a:gs pos="0">
-                      <a:prstClr val="black"/>
-                    </a:gs>
-                    <a:gs pos="100000">
-                      <a:prstClr val="black"/>
-                    </a:gs>
-                  </a:gsLst>
-                  <a:lin ang="5400000" scaled="0"/>
-                </a:gradFill>
-                <a:latin typeface="Segoe UI" pitchFamily="34" charset="0"/>
-                <a:ea typeface="Segoe UI" pitchFamily="34" charset="0"/>
-                <a:cs typeface="Segoe UI" pitchFamily="34" charset="0"/>
-              </a:rPr>
-              <a:t>© Microsoft Corporation. All rights reserved. MICROSOFT MAKES NO WARRANTIES, EXPRESS, IMPLIED OR STATUTORY, AS TO THE INFORMATION IN THIS PRESENTATION.</a:t>
-            </a:r>
-            <a:endParaRPr lang="en-US" sz="400" dirty="0">
-              <a:gradFill>
-                <a:gsLst>
-                  <a:gs pos="0">
-                    <a:prstClr val="black"/>
-                  </a:gs>
-                  <a:gs pos="100000">
-                    <a:prstClr val="black"/>
-                  </a:gs>
-                </a:gsLst>
-                <a:lin ang="5400000" scaled="0"/>
-              </a:gradFill>
-              <a:latin typeface="Segoe UI" pitchFamily="34" charset="0"/>
-              <a:ea typeface="Segoe UI" pitchFamily="34" charset="0"/>
-              <a:cs typeface="Segoe UI" pitchFamily="34" charset="0"/>
-            </a:endParaRPr>
+            <a:endParaRPr lang="en-US"/>
           </a:p>
         </p:txBody>
       </p:sp>
     </p:spTree>
     <p:extLst>
       <p:ext uri="{BB962C8B-B14F-4D97-AF65-F5344CB8AC3E}">
-        <p14:creationId xmlns:p14="http://schemas.microsoft.com/office/powerpoint/2010/main" val="4011344012"/>
+        <p14:creationId xmlns:p14="http://schemas.microsoft.com/office/powerpoint/2010/main" val="671285550"/>
       </p:ext>
     </p:extLst>
   </p:cSld>
@@ -1559,7 +1428,12 @@
             <p:ph type="sldImg"/>
           </p:nvPr>
         </p:nvSpPr>
-        <p:spPr/>
+        <p:spPr>
+          <a:xfrm>
+            <a:off x="381000" y="685800"/>
+            <a:ext cx="6096000" cy="3429000"/>
+          </a:xfrm>
+        </p:spPr>
       </p:sp>
       <p:sp>
         <p:nvSpPr>
@@ -1569,6 +1443,58 @@
           </p:cNvSpPr>
           <p:nvPr>
             <p:ph type="body" idx="1"/>
+          </p:nvPr>
+        </p:nvSpPr>
+        <p:spPr/>
+        <p:txBody>
+          <a:bodyPr>
+            <a:normAutofit/>
+          </a:bodyPr>
+          <a:lstStyle/>
+          <a:p>
+            <a:endParaRPr lang="en-US" dirty="0"/>
+          </a:p>
+        </p:txBody>
+      </p:sp>
+      <p:sp>
+        <p:nvSpPr>
+          <p:cNvPr id="4" name="Header Placeholder 3"/>
+          <p:cNvSpPr>
+            <a:spLocks noGrp="1"/>
+          </p:cNvSpPr>
+          <p:nvPr>
+            <p:ph type="hdr" sz="quarter" idx="10"/>
+          </p:nvPr>
+        </p:nvSpPr>
+        <p:spPr>
+          <a:xfrm>
+            <a:off x="0" y="0"/>
+            <a:ext cx="2971800" cy="457200"/>
+          </a:xfrm>
+          <a:prstGeom prst="rect">
+            <a:avLst/>
+          </a:prstGeom>
+        </p:spPr>
+        <p:txBody>
+          <a:bodyPr/>
+          <a:lstStyle/>
+          <a:p>
+            <a:endParaRPr lang="en-US" dirty="0">
+              <a:solidFill>
+                <a:prstClr val="black"/>
+              </a:solidFill>
+            </a:endParaRPr>
+          </a:p>
+        </p:txBody>
+      </p:sp>
+      <p:sp>
+        <p:nvSpPr>
+          <p:cNvPr id="5" name="Date Placeholder 4"/>
+          <p:cNvSpPr>
+            <a:spLocks noGrp="1"/>
+          </p:cNvSpPr>
+          <p:nvPr>
+            <p:ph type="dt" idx="11"/>
           </p:nvPr>
         </p:nvSpPr>
         <p:spPr/>
@@ -1576,18 +1502,30 @@
           <a:bodyPr/>
           <a:lstStyle/>
           <a:p>
-            <a:endParaRPr lang="en-US" dirty="0"/>
+            <a:fld id="{8AB9A6D4-FB34-4BDB-BA1E-7271914431FC}" type="datetime8">
+              <a:rPr lang="en-US" smtClean="0">
+                <a:solidFill>
+                  <a:prstClr val="black"/>
+                </a:solidFill>
+              </a:rPr>
+              <a:t>3/28/2020 4:25 PM</a:t>
+            </a:fld>
+            <a:endParaRPr lang="en-US" dirty="0">
+              <a:solidFill>
+                <a:prstClr val="black"/>
+              </a:solidFill>
+            </a:endParaRPr>
           </a:p>
         </p:txBody>
       </p:sp>
       <p:sp>
         <p:nvSpPr>
-          <p:cNvPr id="4" name="Header Placeholder 3"/>
+          <p:cNvPr id="7" name="Slide Number Placeholder 6"/>
           <p:cNvSpPr>
             <a:spLocks noGrp="1"/>
           </p:cNvSpPr>
           <p:nvPr>
-            <p:ph type="hdr" sz="quarter" idx="10"/>
+            <p:ph type="sldNum" sz="quarter" idx="13"/>
           </p:nvPr>
         </p:nvSpPr>
         <p:spPr/>
@@ -1595,18 +1533,31 @@
           <a:bodyPr/>
           <a:lstStyle/>
           <a:p>
-            <a:endParaRPr lang="en-US" dirty="0"/>
+            <a:fld id="{EC87E0CF-87F6-4B58-B8B8-DCAB2DAAF3CA}" type="slidenum">
+              <a:rPr lang="en-US" smtClean="0">
+                <a:solidFill>
+                  <a:prstClr val="black"/>
+                </a:solidFill>
+              </a:rPr>
+              <a:pPr/>
+              <a:t>19</a:t>
+            </a:fld>
+            <a:endParaRPr lang="en-US" dirty="0">
+              <a:solidFill>
+                <a:prstClr val="black"/>
+              </a:solidFill>
+            </a:endParaRPr>
           </a:p>
         </p:txBody>
       </p:sp>
       <p:sp>
         <p:nvSpPr>
-          <p:cNvPr id="5" name="Footer Placeholder 4"/>
+          <p:cNvPr id="6" name="Footer Placeholder 5"/>
           <p:cNvSpPr>
             <a:spLocks noGrp="1"/>
           </p:cNvSpPr>
           <p:nvPr>
-            <p:ph type="ftr" sz="quarter" idx="11"/>
+            <p:ph type="ftr" sz="quarter" idx="14"/>
           </p:nvPr>
         </p:nvSpPr>
         <p:spPr/>
@@ -1653,57 +1604,10 @@
           </a:p>
         </p:txBody>
       </p:sp>
-      <p:sp>
-        <p:nvSpPr>
-          <p:cNvPr id="6" name="Date Placeholder 5"/>
-          <p:cNvSpPr>
-            <a:spLocks noGrp="1"/>
-          </p:cNvSpPr>
-          <p:nvPr>
-            <p:ph type="dt" idx="12"/>
-          </p:nvPr>
-        </p:nvSpPr>
-        <p:spPr/>
-        <p:txBody>
-          <a:bodyPr/>
-          <a:lstStyle/>
-          <a:p>
-            <a:fld id="{328EAAE8-B538-48EB-83B5-2B364220CC89}" type="datetime8">
-              <a:rPr lang="en-US" smtClean="0"/>
-              <a:t>3/28/2020 4:25 PM</a:t>
-            </a:fld>
-            <a:endParaRPr lang="en-US" dirty="0"/>
-          </a:p>
-        </p:txBody>
-      </p:sp>
-      <p:sp>
-        <p:nvSpPr>
-          <p:cNvPr id="7" name="Slide Number Placeholder 6"/>
-          <p:cNvSpPr>
-            <a:spLocks noGrp="1"/>
-          </p:cNvSpPr>
-          <p:nvPr>
-            <p:ph type="sldNum" sz="quarter" idx="13"/>
-          </p:nvPr>
-        </p:nvSpPr>
-        <p:spPr/>
-        <p:txBody>
-          <a:bodyPr/>
-          <a:lstStyle/>
-          <a:p>
-            <a:fld id="{B4008EB6-D09E-4580-8CD6-DDB14511944F}" type="slidenum">
-              <a:rPr lang="en-US" smtClean="0"/>
-              <a:pPr/>
-              <a:t>19</a:t>
-            </a:fld>
-            <a:endParaRPr lang="en-US" dirty="0"/>
-          </a:p>
-        </p:txBody>
-      </p:sp>
     </p:spTree>
     <p:extLst>
       <p:ext uri="{BB962C8B-B14F-4D97-AF65-F5344CB8AC3E}">
-        <p14:creationId xmlns:p14="http://schemas.microsoft.com/office/powerpoint/2010/main" val="3283041316"/>
+        <p14:creationId xmlns:p14="http://schemas.microsoft.com/office/powerpoint/2010/main" val="4011344012"/>
       </p:ext>
     </p:extLst>
   </p:cSld>
@@ -1847,12 +1751,12 @@
       </p:sp>
       <p:sp>
         <p:nvSpPr>
-          <p:cNvPr id="6" name="Slide Number Placeholder 5"/>
+          <p:cNvPr id="4" name="Header Placeholder 3"/>
           <p:cNvSpPr>
             <a:spLocks noGrp="1"/>
           </p:cNvSpPr>
           <p:nvPr>
-            <p:ph type="sldNum" sz="quarter" idx="12"/>
+            <p:ph type="hdr" sz="quarter" idx="10"/>
           </p:nvPr>
         </p:nvSpPr>
         <p:spPr/>
@@ -1860,53 +1764,6 @@
           <a:bodyPr/>
           <a:lstStyle/>
           <a:p>
-            <a:fld id="{B4008EB6-D09E-4580-8CD6-DDB14511944F}" type="slidenum">
-              <a:rPr lang="en-US" smtClean="0"/>
-              <a:pPr/>
-              <a:t>20</a:t>
-            </a:fld>
-            <a:endParaRPr lang="en-US" dirty="0"/>
-          </a:p>
-        </p:txBody>
-      </p:sp>
-      <p:sp>
-        <p:nvSpPr>
-          <p:cNvPr id="10" name="Date Placeholder 9"/>
-          <p:cNvSpPr>
-            <a:spLocks noGrp="1"/>
-          </p:cNvSpPr>
-          <p:nvPr>
-            <p:ph type="dt" idx="13"/>
-          </p:nvPr>
-        </p:nvSpPr>
-        <p:spPr/>
-        <p:txBody>
-          <a:bodyPr/>
-          <a:lstStyle/>
-          <a:p>
-            <a:fld id="{5A70A388-5CB4-42F2-85B9-1AE1F63398FA}" type="datetime8">
-              <a:rPr lang="en-US" smtClean="0"/>
-              <a:t>3/28/2020 4:25 PM</a:t>
-            </a:fld>
-            <a:endParaRPr lang="en-US" dirty="0"/>
-          </a:p>
-        </p:txBody>
-      </p:sp>
-      <p:sp>
-        <p:nvSpPr>
-          <p:cNvPr id="12" name="Header Placeholder 11"/>
-          <p:cNvSpPr>
-            <a:spLocks noGrp="1"/>
-          </p:cNvSpPr>
-          <p:nvPr>
-            <p:ph type="hdr" sz="quarter" idx="15"/>
-          </p:nvPr>
-        </p:nvSpPr>
-        <p:spPr/>
-        <p:txBody>
-          <a:bodyPr/>
-          <a:lstStyle/>
-          <a:p>
             <a:endParaRPr lang="en-US" dirty="0"/>
           </a:p>
         </p:txBody>
@@ -1918,7 +1775,7 @@
             <a:spLocks noGrp="1"/>
           </p:cNvSpPr>
           <p:nvPr>
-            <p:ph type="ftr" sz="quarter" idx="16"/>
+            <p:ph type="ftr" sz="quarter" idx="11"/>
           </p:nvPr>
         </p:nvSpPr>
         <p:spPr/>
@@ -1965,10 +1822,57 @@
           </a:p>
         </p:txBody>
       </p:sp>
+      <p:sp>
+        <p:nvSpPr>
+          <p:cNvPr id="6" name="Date Placeholder 5"/>
+          <p:cNvSpPr>
+            <a:spLocks noGrp="1"/>
+          </p:cNvSpPr>
+          <p:nvPr>
+            <p:ph type="dt" idx="12"/>
+          </p:nvPr>
+        </p:nvSpPr>
+        <p:spPr/>
+        <p:txBody>
+          <a:bodyPr/>
+          <a:lstStyle/>
+          <a:p>
+            <a:fld id="{328EAAE8-B538-48EB-83B5-2B364220CC89}" type="datetime8">
+              <a:rPr lang="en-US" smtClean="0"/>
+              <a:t>3/28/2020 4:25 PM</a:t>
+            </a:fld>
+            <a:endParaRPr lang="en-US" dirty="0"/>
+          </a:p>
+        </p:txBody>
+      </p:sp>
+      <p:sp>
+        <p:nvSpPr>
+          <p:cNvPr id="7" name="Slide Number Placeholder 6"/>
+          <p:cNvSpPr>
+            <a:spLocks noGrp="1"/>
+          </p:cNvSpPr>
+          <p:nvPr>
+            <p:ph type="sldNum" sz="quarter" idx="13"/>
+          </p:nvPr>
+        </p:nvSpPr>
+        <p:spPr/>
+        <p:txBody>
+          <a:bodyPr/>
+          <a:lstStyle/>
+          <a:p>
+            <a:fld id="{B4008EB6-D09E-4580-8CD6-DDB14511944F}" type="slidenum">
+              <a:rPr lang="en-US" smtClean="0"/>
+              <a:pPr/>
+              <a:t>20</a:t>
+            </a:fld>
+            <a:endParaRPr lang="en-US" dirty="0"/>
+          </a:p>
+        </p:txBody>
+      </p:sp>
     </p:spTree>
     <p:extLst>
       <p:ext uri="{BB962C8B-B14F-4D97-AF65-F5344CB8AC3E}">
-        <p14:creationId xmlns:p14="http://schemas.microsoft.com/office/powerpoint/2010/main" val="2019336904"/>
+        <p14:creationId xmlns:p14="http://schemas.microsoft.com/office/powerpoint/2010/main" val="3283041316"/>
       </p:ext>
     </p:extLst>
   </p:cSld>
@@ -2005,15 +1909,7 @@
             <p:ph type="sldImg"/>
           </p:nvPr>
         </p:nvSpPr>
-        <p:spPr>
-          <a:xfrm>
-            <a:off x="381000" y="685800"/>
-            <a:ext cx="6096000" cy="3429000"/>
-          </a:xfrm>
-          <a:prstGeom prst="rect">
-            <a:avLst/>
-          </a:prstGeom>
-        </p:spPr>
+        <p:spPr/>
       </p:sp>
       <p:sp>
         <p:nvSpPr>
@@ -2025,59 +1921,18 @@
             <p:ph type="body" idx="1"/>
           </p:nvPr>
         </p:nvSpPr>
-        <p:spPr>
-          <a:xfrm>
-            <a:off x="685800" y="4343400"/>
-            <a:ext cx="5486400" cy="4114800"/>
-          </a:xfrm>
-          <a:prstGeom prst="rect">
-            <a:avLst/>
-          </a:prstGeom>
-        </p:spPr>
-        <p:txBody>
-          <a:bodyPr>
-            <a:normAutofit/>
-          </a:bodyPr>
-          <a:lstStyle/>
-          <a:p>
-            <a:endParaRPr lang="en-US" dirty="0"/>
-          </a:p>
-        </p:txBody>
-      </p:sp>
-      <p:sp>
-        <p:nvSpPr>
-          <p:cNvPr id="4" name="Date Placeholder 3"/>
-          <p:cNvSpPr>
-            <a:spLocks noGrp="1"/>
-          </p:cNvSpPr>
-          <p:nvPr>
-            <p:ph type="dt" idx="10"/>
-          </p:nvPr>
-        </p:nvSpPr>
-        <p:spPr>
-          <a:xfrm>
-            <a:off x="3884613" y="0"/>
-            <a:ext cx="2971800" cy="457200"/>
-          </a:xfrm>
-          <a:prstGeom prst="rect">
-            <a:avLst/>
-          </a:prstGeom>
-        </p:spPr>
+        <p:spPr/>
         <p:txBody>
           <a:bodyPr/>
           <a:lstStyle/>
           <a:p>
-            <a:fld id="{6939CF7E-134C-4B4A-9853-17D7568CBCC2}" type="datetime8">
-              <a:rPr lang="en-US" smtClean="0"/>
-              <a:t>3/28/2020 4:25 PM</a:t>
-            </a:fld>
             <a:endParaRPr lang="en-US" dirty="0"/>
           </a:p>
         </p:txBody>
       </p:sp>
       <p:sp>
         <p:nvSpPr>
-          <p:cNvPr id="7" name="Slide Number Placeholder 6"/>
+          <p:cNvPr id="6" name="Slide Number Placeholder 5"/>
           <p:cNvSpPr>
             <a:spLocks noGrp="1"/>
           </p:cNvSpPr>
@@ -2085,20 +1940,12 @@
             <p:ph type="sldNum" sz="quarter" idx="12"/>
           </p:nvPr>
         </p:nvSpPr>
-        <p:spPr>
-          <a:xfrm>
-            <a:off x="6172199" y="8685213"/>
-            <a:ext cx="684213" cy="457200"/>
-          </a:xfrm>
-          <a:prstGeom prst="rect">
-            <a:avLst/>
-          </a:prstGeom>
-        </p:spPr>
+        <p:spPr/>
         <p:txBody>
           <a:bodyPr/>
           <a:lstStyle/>
           <a:p>
-            <a:fld id="{8B263312-38AA-4E1E-B2B5-0F8F122B24FE}" type="slidenum">
+            <a:fld id="{B4008EB6-D09E-4580-8CD6-DDB14511944F}" type="slidenum">
               <a:rPr lang="en-US" smtClean="0"/>
               <a:pPr/>
               <a:t>21</a:t>
@@ -2109,12 +1956,54 @@
       </p:sp>
       <p:sp>
         <p:nvSpPr>
-          <p:cNvPr id="6" name="Footer Placeholder 5"/>
+          <p:cNvPr id="10" name="Date Placeholder 9"/>
           <p:cNvSpPr>
             <a:spLocks noGrp="1"/>
           </p:cNvSpPr>
           <p:nvPr>
-            <p:ph type="ftr" sz="quarter" idx="13"/>
+            <p:ph type="dt" idx="13"/>
+          </p:nvPr>
+        </p:nvSpPr>
+        <p:spPr/>
+        <p:txBody>
+          <a:bodyPr/>
+          <a:lstStyle/>
+          <a:p>
+            <a:fld id="{5A70A388-5CB4-42F2-85B9-1AE1F63398FA}" type="datetime8">
+              <a:rPr lang="en-US" smtClean="0"/>
+              <a:t>3/28/2020 4:25 PM</a:t>
+            </a:fld>
+            <a:endParaRPr lang="en-US" dirty="0"/>
+          </a:p>
+        </p:txBody>
+      </p:sp>
+      <p:sp>
+        <p:nvSpPr>
+          <p:cNvPr id="12" name="Header Placeholder 11"/>
+          <p:cNvSpPr>
+            <a:spLocks noGrp="1"/>
+          </p:cNvSpPr>
+          <p:nvPr>
+            <p:ph type="hdr" sz="quarter" idx="15"/>
+          </p:nvPr>
+        </p:nvSpPr>
+        <p:spPr/>
+        <p:txBody>
+          <a:bodyPr/>
+          <a:lstStyle/>
+          <a:p>
+            <a:endParaRPr lang="en-US" dirty="0"/>
+          </a:p>
+        </p:txBody>
+      </p:sp>
+      <p:sp>
+        <p:nvSpPr>
+          <p:cNvPr id="5" name="Footer Placeholder 4"/>
+          <p:cNvSpPr>
+            <a:spLocks noGrp="1"/>
+          </p:cNvSpPr>
+          <p:nvPr>
+            <p:ph type="ftr" sz="quarter" idx="16"/>
           </p:nvPr>
         </p:nvSpPr>
         <p:spPr/>
@@ -2161,29 +2050,10 @@
           </a:p>
         </p:txBody>
       </p:sp>
-      <p:sp>
-        <p:nvSpPr>
-          <p:cNvPr id="9" name="Header Placeholder 8"/>
-          <p:cNvSpPr>
-            <a:spLocks noGrp="1"/>
-          </p:cNvSpPr>
-          <p:nvPr>
-            <p:ph type="hdr" sz="quarter" idx="14"/>
-          </p:nvPr>
-        </p:nvSpPr>
-        <p:spPr/>
-        <p:txBody>
-          <a:bodyPr/>
-          <a:lstStyle/>
-          <a:p>
-            <a:endParaRPr lang="en-US" dirty="0"/>
-          </a:p>
-        </p:txBody>
-      </p:sp>
     </p:spTree>
     <p:extLst>
       <p:ext uri="{BB962C8B-B14F-4D97-AF65-F5344CB8AC3E}">
-        <p14:creationId xmlns:p14="http://schemas.microsoft.com/office/powerpoint/2010/main" val="2215225009"/>
+        <p14:creationId xmlns:p14="http://schemas.microsoft.com/office/powerpoint/2010/main" val="2019336904"/>
       </p:ext>
     </p:extLst>
   </p:cSld>
@@ -2220,7 +2090,15 @@
             <p:ph type="sldImg"/>
           </p:nvPr>
         </p:nvSpPr>
-        <p:spPr/>
+        <p:spPr>
+          <a:xfrm>
+            <a:off x="381000" y="685800"/>
+            <a:ext cx="6096000" cy="3429000"/>
+          </a:xfrm>
+          <a:prstGeom prst="rect">
+            <a:avLst/>
+          </a:prstGeom>
+        </p:spPr>
       </p:sp>
       <p:sp>
         <p:nvSpPr>
@@ -2232,42 +2110,96 @@
             <p:ph type="body" idx="1"/>
           </p:nvPr>
         </p:nvSpPr>
-        <p:spPr/>
+        <p:spPr>
+          <a:xfrm>
+            <a:off x="685800" y="4343400"/>
+            <a:ext cx="5486400" cy="4114800"/>
+          </a:xfrm>
+          <a:prstGeom prst="rect">
+            <a:avLst/>
+          </a:prstGeom>
+        </p:spPr>
+        <p:txBody>
+          <a:bodyPr>
+            <a:normAutofit/>
+          </a:bodyPr>
+          <a:lstStyle/>
+          <a:p>
+            <a:endParaRPr lang="en-US" dirty="0"/>
+          </a:p>
+        </p:txBody>
+      </p:sp>
+      <p:sp>
+        <p:nvSpPr>
+          <p:cNvPr id="4" name="Date Placeholder 3"/>
+          <p:cNvSpPr>
+            <a:spLocks noGrp="1"/>
+          </p:cNvSpPr>
+          <p:nvPr>
+            <p:ph type="dt" idx="10"/>
+          </p:nvPr>
+        </p:nvSpPr>
+        <p:spPr>
+          <a:xfrm>
+            <a:off x="3884613" y="0"/>
+            <a:ext cx="2971800" cy="457200"/>
+          </a:xfrm>
+          <a:prstGeom prst="rect">
+            <a:avLst/>
+          </a:prstGeom>
+        </p:spPr>
         <p:txBody>
           <a:bodyPr/>
           <a:lstStyle/>
           <a:p>
+            <a:fld id="{6939CF7E-134C-4B4A-9853-17D7568CBCC2}" type="datetime8">
+              <a:rPr lang="en-US" smtClean="0"/>
+              <a:t>3/28/2020 4:25 PM</a:t>
+            </a:fld>
             <a:endParaRPr lang="en-US" dirty="0"/>
           </a:p>
         </p:txBody>
       </p:sp>
       <p:sp>
         <p:nvSpPr>
-          <p:cNvPr id="4" name="Header Placeholder 3"/>
+          <p:cNvPr id="7" name="Slide Number Placeholder 6"/>
           <p:cNvSpPr>
             <a:spLocks noGrp="1"/>
           </p:cNvSpPr>
           <p:nvPr>
-            <p:ph type="hdr" sz="quarter" idx="10"/>
+            <p:ph type="sldNum" sz="quarter" idx="12"/>
           </p:nvPr>
         </p:nvSpPr>
-        <p:spPr/>
+        <p:spPr>
+          <a:xfrm>
+            <a:off x="6172199" y="8685213"/>
+            <a:ext cx="684213" cy="457200"/>
+          </a:xfrm>
+          <a:prstGeom prst="rect">
+            <a:avLst/>
+          </a:prstGeom>
+        </p:spPr>
         <p:txBody>
           <a:bodyPr/>
           <a:lstStyle/>
           <a:p>
+            <a:fld id="{8B263312-38AA-4E1E-B2B5-0F8F122B24FE}" type="slidenum">
+              <a:rPr lang="en-US" smtClean="0"/>
+              <a:pPr/>
+              <a:t>22</a:t>
+            </a:fld>
             <a:endParaRPr lang="en-US" dirty="0"/>
           </a:p>
         </p:txBody>
       </p:sp>
       <p:sp>
         <p:nvSpPr>
-          <p:cNvPr id="5" name="Footer Placeholder 4"/>
+          <p:cNvPr id="6" name="Footer Placeholder 5"/>
           <p:cNvSpPr>
             <a:spLocks noGrp="1"/>
           </p:cNvSpPr>
           <p:nvPr>
-            <p:ph type="ftr" sz="quarter" idx="11"/>
+            <p:ph type="ftr" sz="quarter" idx="13"/>
           </p:nvPr>
         </p:nvSpPr>
         <p:spPr/>
@@ -2316,12 +2248,12 @@
       </p:sp>
       <p:sp>
         <p:nvSpPr>
-          <p:cNvPr id="6" name="Date Placeholder 5"/>
+          <p:cNvPr id="9" name="Header Placeholder 8"/>
           <p:cNvSpPr>
             <a:spLocks noGrp="1"/>
           </p:cNvSpPr>
           <p:nvPr>
-            <p:ph type="dt" idx="12"/>
+            <p:ph type="hdr" sz="quarter" idx="14"/>
           </p:nvPr>
         </p:nvSpPr>
         <p:spPr/>
@@ -2329,34 +2261,6 @@
           <a:bodyPr/>
           <a:lstStyle/>
           <a:p>
-            <a:fld id="{B76134C8-AC9E-49DD-B3D6-722B1A93F18D}" type="datetime8">
-              <a:rPr lang="en-US" smtClean="0"/>
-              <a:t>3/28/2020 4:25 PM</a:t>
-            </a:fld>
-            <a:endParaRPr lang="en-US" dirty="0"/>
-          </a:p>
-        </p:txBody>
-      </p:sp>
-      <p:sp>
-        <p:nvSpPr>
-          <p:cNvPr id="7" name="Slide Number Placeholder 6"/>
-          <p:cNvSpPr>
-            <a:spLocks noGrp="1"/>
-          </p:cNvSpPr>
-          <p:nvPr>
-            <p:ph type="sldNum" sz="quarter" idx="13"/>
-          </p:nvPr>
-        </p:nvSpPr>
-        <p:spPr/>
-        <p:txBody>
-          <a:bodyPr/>
-          <a:lstStyle/>
-          <a:p>
-            <a:fld id="{B4008EB6-D09E-4580-8CD6-DDB14511944F}" type="slidenum">
-              <a:rPr lang="en-US" smtClean="0"/>
-              <a:pPr/>
-              <a:t>22</a:t>
-            </a:fld>
             <a:endParaRPr lang="en-US" dirty="0"/>
           </a:p>
         </p:txBody>
@@ -2364,7 +2268,7 @@
     </p:spTree>
     <p:extLst>
       <p:ext uri="{BB962C8B-B14F-4D97-AF65-F5344CB8AC3E}">
-        <p14:creationId xmlns:p14="http://schemas.microsoft.com/office/powerpoint/2010/main" val="3547892515"/>
+        <p14:creationId xmlns:p14="http://schemas.microsoft.com/office/powerpoint/2010/main" val="2215225009"/>
       </p:ext>
     </p:extLst>
   </p:cSld>
@@ -2418,7 +2322,7 @@
           <a:bodyPr/>
           <a:lstStyle/>
           <a:p>
-            <a:endParaRPr lang="en-US"/>
+            <a:endParaRPr lang="en-US" dirty="0"/>
           </a:p>
         </p:txBody>
       </p:sp>
@@ -2510,7 +2414,7 @@
           <a:bodyPr/>
           <a:lstStyle/>
           <a:p>
-            <a:fld id="{34FAA446-E61B-4D43-A3B1-7749AA6DC131}" type="datetime8">
+            <a:fld id="{B76134C8-AC9E-49DD-B3D6-722B1A93F18D}" type="datetime8">
               <a:rPr lang="en-US" smtClean="0"/>
               <a:t>3/28/2020 4:25 PM</a:t>
             </a:fld>
@@ -2545,7 +2449,7 @@
     </p:spTree>
     <p:extLst>
       <p:ext uri="{BB962C8B-B14F-4D97-AF65-F5344CB8AC3E}">
-        <p14:creationId xmlns:p14="http://schemas.microsoft.com/office/powerpoint/2010/main" val="1325077928"/>
+        <p14:creationId xmlns:p14="http://schemas.microsoft.com/office/powerpoint/2010/main" val="3547892515"/>
       </p:ext>
     </p:extLst>
   </p:cSld>
@@ -2691,7 +2595,7 @@
           <a:bodyPr/>
           <a:lstStyle/>
           <a:p>
-            <a:fld id="{F86059B6-667D-4F24-AA48-46C1EA5D9E8E}" type="datetime8">
+            <a:fld id="{34FAA446-E61B-4D43-A3B1-7749AA6DC131}" type="datetime8">
               <a:rPr lang="en-US" smtClean="0"/>
               <a:t>3/28/2020 4:25 PM</a:t>
             </a:fld>
@@ -2726,7 +2630,7 @@
     </p:spTree>
     <p:extLst>
       <p:ext uri="{BB962C8B-B14F-4D97-AF65-F5344CB8AC3E}">
-        <p14:creationId xmlns:p14="http://schemas.microsoft.com/office/powerpoint/2010/main" val="1742629459"/>
+        <p14:creationId xmlns:p14="http://schemas.microsoft.com/office/powerpoint/2010/main" val="1325077928"/>
       </p:ext>
     </p:extLst>
   </p:cSld>
@@ -2780,7 +2684,7 @@
           <a:bodyPr/>
           <a:lstStyle/>
           <a:p>
-            <a:endParaRPr lang="en-US" dirty="0"/>
+            <a:endParaRPr lang="en-US"/>
           </a:p>
         </p:txBody>
       </p:sp>
@@ -2872,7 +2776,7 @@
           <a:bodyPr/>
           <a:lstStyle/>
           <a:p>
-            <a:fld id="{35A2D088-BDBD-41A5-ADCE-5C6A4DC08057}" type="datetime8">
+            <a:fld id="{F86059B6-667D-4F24-AA48-46C1EA5D9E8E}" type="datetime8">
               <a:rPr lang="en-US" smtClean="0"/>
               <a:t>3/28/2020 4:25 PM</a:t>
             </a:fld>
@@ -2907,7 +2811,7 @@
     </p:spTree>
     <p:extLst>
       <p:ext uri="{BB962C8B-B14F-4D97-AF65-F5344CB8AC3E}">
-        <p14:creationId xmlns:p14="http://schemas.microsoft.com/office/powerpoint/2010/main" val="2696667868"/>
+        <p14:creationId xmlns:p14="http://schemas.microsoft.com/office/powerpoint/2010/main" val="1742629459"/>
       </p:ext>
     </p:extLst>
   </p:cSld>
@@ -2967,12 +2871,12 @@
       </p:sp>
       <p:sp>
         <p:nvSpPr>
-          <p:cNvPr id="6" name="Slide Number Placeholder 5"/>
+          <p:cNvPr id="4" name="Header Placeholder 3"/>
           <p:cNvSpPr>
             <a:spLocks noGrp="1"/>
           </p:cNvSpPr>
           <p:nvPr>
-            <p:ph type="sldNum" sz="quarter" idx="12"/>
+            <p:ph type="hdr" sz="quarter" idx="10"/>
           </p:nvPr>
         </p:nvSpPr>
         <p:spPr/>
@@ -2980,46 +2884,18 @@
           <a:bodyPr/>
           <a:lstStyle/>
           <a:p>
-            <a:fld id="{B4008EB6-D09E-4580-8CD6-DDB14511944F}" type="slidenum">
-              <a:rPr lang="en-US" smtClean="0"/>
-              <a:pPr/>
-              <a:t>26</a:t>
-            </a:fld>
             <a:endParaRPr lang="en-US" dirty="0"/>
           </a:p>
         </p:txBody>
       </p:sp>
       <p:sp>
         <p:nvSpPr>
-          <p:cNvPr id="10" name="Date Placeholder 9"/>
+          <p:cNvPr id="5" name="Footer Placeholder 4"/>
           <p:cNvSpPr>
             <a:spLocks noGrp="1"/>
           </p:cNvSpPr>
           <p:nvPr>
-            <p:ph type="dt" idx="13"/>
-          </p:nvPr>
-        </p:nvSpPr>
-        <p:spPr/>
-        <p:txBody>
-          <a:bodyPr/>
-          <a:lstStyle/>
-          <a:p>
-            <a:fld id="{174E4CE6-2FE4-433F-87B8-CB5DD266EBFC}" type="datetime8">
-              <a:rPr lang="en-US" smtClean="0"/>
-              <a:t>3/28/2020 4:25 PM</a:t>
-            </a:fld>
-            <a:endParaRPr lang="en-US" dirty="0"/>
-          </a:p>
-        </p:txBody>
-      </p:sp>
-      <p:sp>
-        <p:nvSpPr>
-          <p:cNvPr id="4" name="Footer Placeholder 3"/>
-          <p:cNvSpPr>
-            <a:spLocks noGrp="1"/>
-          </p:cNvSpPr>
-          <p:nvPr>
-            <p:ph type="ftr" sz="quarter" idx="14"/>
+            <p:ph type="ftr" sz="quarter" idx="11"/>
           </p:nvPr>
         </p:nvSpPr>
         <p:spPr/>
@@ -3068,12 +2944,12 @@
       </p:sp>
       <p:sp>
         <p:nvSpPr>
-          <p:cNvPr id="5" name="Header Placeholder 4"/>
+          <p:cNvPr id="6" name="Date Placeholder 5"/>
           <p:cNvSpPr>
             <a:spLocks noGrp="1"/>
           </p:cNvSpPr>
           <p:nvPr>
-            <p:ph type="hdr" sz="quarter" idx="15"/>
+            <p:ph type="dt" idx="12"/>
           </p:nvPr>
         </p:nvSpPr>
         <p:spPr/>
@@ -3081,6 +2957,34 @@
           <a:bodyPr/>
           <a:lstStyle/>
           <a:p>
+            <a:fld id="{35A2D088-BDBD-41A5-ADCE-5C6A4DC08057}" type="datetime8">
+              <a:rPr lang="en-US" smtClean="0"/>
+              <a:t>3/28/2020 4:25 PM</a:t>
+            </a:fld>
+            <a:endParaRPr lang="en-US" dirty="0"/>
+          </a:p>
+        </p:txBody>
+      </p:sp>
+      <p:sp>
+        <p:nvSpPr>
+          <p:cNvPr id="7" name="Slide Number Placeholder 6"/>
+          <p:cNvSpPr>
+            <a:spLocks noGrp="1"/>
+          </p:cNvSpPr>
+          <p:nvPr>
+            <p:ph type="sldNum" sz="quarter" idx="13"/>
+          </p:nvPr>
+        </p:nvSpPr>
+        <p:spPr/>
+        <p:txBody>
+          <a:bodyPr/>
+          <a:lstStyle/>
+          <a:p>
+            <a:fld id="{B4008EB6-D09E-4580-8CD6-DDB14511944F}" type="slidenum">
+              <a:rPr lang="en-US" smtClean="0"/>
+              <a:pPr/>
+              <a:t>26</a:t>
+            </a:fld>
             <a:endParaRPr lang="en-US" dirty="0"/>
           </a:p>
         </p:txBody>
@@ -3088,7 +2992,7 @@
     </p:spTree>
     <p:extLst>
       <p:ext uri="{BB962C8B-B14F-4D97-AF65-F5344CB8AC3E}">
-        <p14:creationId xmlns:p14="http://schemas.microsoft.com/office/powerpoint/2010/main" val="4230932213"/>
+        <p14:creationId xmlns:p14="http://schemas.microsoft.com/office/powerpoint/2010/main" val="2696667868"/>
       </p:ext>
     </p:extLst>
   </p:cSld>
@@ -3125,6 +3029,187 @@
             <p:ph type="sldImg"/>
           </p:nvPr>
         </p:nvSpPr>
+        <p:spPr/>
+      </p:sp>
+      <p:sp>
+        <p:nvSpPr>
+          <p:cNvPr id="3" name="Notes Placeholder 2"/>
+          <p:cNvSpPr>
+            <a:spLocks noGrp="1"/>
+          </p:cNvSpPr>
+          <p:nvPr>
+            <p:ph type="body" idx="1"/>
+          </p:nvPr>
+        </p:nvSpPr>
+        <p:spPr/>
+        <p:txBody>
+          <a:bodyPr/>
+          <a:lstStyle/>
+          <a:p>
+            <a:endParaRPr lang="en-US" dirty="0"/>
+          </a:p>
+        </p:txBody>
+      </p:sp>
+      <p:sp>
+        <p:nvSpPr>
+          <p:cNvPr id="6" name="Slide Number Placeholder 5"/>
+          <p:cNvSpPr>
+            <a:spLocks noGrp="1"/>
+          </p:cNvSpPr>
+          <p:nvPr>
+            <p:ph type="sldNum" sz="quarter" idx="12"/>
+          </p:nvPr>
+        </p:nvSpPr>
+        <p:spPr/>
+        <p:txBody>
+          <a:bodyPr/>
+          <a:lstStyle/>
+          <a:p>
+            <a:fld id="{B4008EB6-D09E-4580-8CD6-DDB14511944F}" type="slidenum">
+              <a:rPr lang="en-US" smtClean="0"/>
+              <a:pPr/>
+              <a:t>27</a:t>
+            </a:fld>
+            <a:endParaRPr lang="en-US" dirty="0"/>
+          </a:p>
+        </p:txBody>
+      </p:sp>
+      <p:sp>
+        <p:nvSpPr>
+          <p:cNvPr id="10" name="Date Placeholder 9"/>
+          <p:cNvSpPr>
+            <a:spLocks noGrp="1"/>
+          </p:cNvSpPr>
+          <p:nvPr>
+            <p:ph type="dt" idx="13"/>
+          </p:nvPr>
+        </p:nvSpPr>
+        <p:spPr/>
+        <p:txBody>
+          <a:bodyPr/>
+          <a:lstStyle/>
+          <a:p>
+            <a:fld id="{174E4CE6-2FE4-433F-87B8-CB5DD266EBFC}" type="datetime8">
+              <a:rPr lang="en-US" smtClean="0"/>
+              <a:t>3/28/2020 4:25 PM</a:t>
+            </a:fld>
+            <a:endParaRPr lang="en-US" dirty="0"/>
+          </a:p>
+        </p:txBody>
+      </p:sp>
+      <p:sp>
+        <p:nvSpPr>
+          <p:cNvPr id="4" name="Footer Placeholder 3"/>
+          <p:cNvSpPr>
+            <a:spLocks noGrp="1"/>
+          </p:cNvSpPr>
+          <p:nvPr>
+            <p:ph type="ftr" sz="quarter" idx="14"/>
+          </p:nvPr>
+        </p:nvSpPr>
+        <p:spPr/>
+        <p:txBody>
+          <a:bodyPr/>
+          <a:lstStyle/>
+          <a:p>
+            <a:pPr defTabSz="914099" eaLnBrk="0" hangingPunct="0"/>
+            <a:r>
+              <a:rPr lang="en-US" sz="400">
+                <a:gradFill>
+                  <a:gsLst>
+                    <a:gs pos="0">
+                      <a:prstClr val="black"/>
+                    </a:gs>
+                    <a:gs pos="100000">
+                      <a:prstClr val="black"/>
+                    </a:gs>
+                  </a:gsLst>
+                  <a:lin ang="5400000" scaled="0"/>
+                </a:gradFill>
+                <a:latin typeface="Segoe UI" pitchFamily="34" charset="0"/>
+                <a:ea typeface="Segoe UI" pitchFamily="34" charset="0"/>
+                <a:cs typeface="Segoe UI" pitchFamily="34" charset="0"/>
+              </a:rPr>
+              <a:t>© Microsoft Corporation. All rights reserved. MICROSOFT MAKES NO WARRANTIES, EXPRESS, IMPLIED OR STATUTORY, AS TO THE INFORMATION IN THIS PRESENTATION.</a:t>
+            </a:r>
+            <a:endParaRPr lang="en-US" sz="400" dirty="0">
+              <a:gradFill>
+                <a:gsLst>
+                  <a:gs pos="0">
+                    <a:prstClr val="black"/>
+                  </a:gs>
+                  <a:gs pos="100000">
+                    <a:prstClr val="black"/>
+                  </a:gs>
+                </a:gsLst>
+                <a:lin ang="5400000" scaled="0"/>
+              </a:gradFill>
+              <a:latin typeface="Segoe UI" pitchFamily="34" charset="0"/>
+              <a:ea typeface="Segoe UI" pitchFamily="34" charset="0"/>
+              <a:cs typeface="Segoe UI" pitchFamily="34" charset="0"/>
+            </a:endParaRPr>
+          </a:p>
+        </p:txBody>
+      </p:sp>
+      <p:sp>
+        <p:nvSpPr>
+          <p:cNvPr id="5" name="Header Placeholder 4"/>
+          <p:cNvSpPr>
+            <a:spLocks noGrp="1"/>
+          </p:cNvSpPr>
+          <p:nvPr>
+            <p:ph type="hdr" sz="quarter" idx="15"/>
+          </p:nvPr>
+        </p:nvSpPr>
+        <p:spPr/>
+        <p:txBody>
+          <a:bodyPr/>
+          <a:lstStyle/>
+          <a:p>
+            <a:endParaRPr lang="en-US" dirty="0"/>
+          </a:p>
+        </p:txBody>
+      </p:sp>
+    </p:spTree>
+    <p:extLst>
+      <p:ext uri="{BB962C8B-B14F-4D97-AF65-F5344CB8AC3E}">
+        <p14:creationId xmlns:p14="http://schemas.microsoft.com/office/powerpoint/2010/main" val="4230932213"/>
+      </p:ext>
+    </p:extLst>
+  </p:cSld>
+  <p:clrMapOvr>
+    <a:masterClrMapping/>
+  </p:clrMapOvr>
+</p:notes>
+</file>
+
+<file path=ppt/notesSlides/notesSlide28.xml><?xml version="1.0" encoding="utf-8"?>
+<p:notes xmlns:a="http://schemas.openxmlformats.org/drawingml/2006/main" xmlns:r="http://schemas.openxmlformats.org/officeDocument/2006/relationships" xmlns:p="http://schemas.openxmlformats.org/presentationml/2006/main">
+  <p:cSld>
+    <p:spTree>
+      <p:nvGrpSpPr>
+        <p:cNvPr id="1" name=""/>
+        <p:cNvGrpSpPr/>
+        <p:nvPr/>
+      </p:nvGrpSpPr>
+      <p:grpSpPr>
+        <a:xfrm>
+          <a:off x="0" y="0"/>
+          <a:ext cx="0" cy="0"/>
+          <a:chOff x="0" y="0"/>
+          <a:chExt cx="0" cy="0"/>
+        </a:xfrm>
+      </p:grpSpPr>
+      <p:sp>
+        <p:nvSpPr>
+          <p:cNvPr id="2" name="Slide Image Placeholder 1"/>
+          <p:cNvSpPr>
+            <a:spLocks noGrp="1" noRot="1" noChangeAspect="1"/>
+          </p:cNvSpPr>
+          <p:nvPr>
+            <p:ph type="sldImg"/>
+          </p:nvPr>
+        </p:nvSpPr>
         <p:spPr>
           <a:xfrm>
             <a:off x="381000" y="685800"/>
@@ -3237,7 +3322,7 @@
                 </a:solidFill>
               </a:rPr>
               <a:pPr/>
-              <a:t>27</a:t>
+              <a:t>28</a:t>
             </a:fld>
             <a:endParaRPr lang="en-US" dirty="0">
               <a:solidFill>
@@ -3987,6 +4072,37 @@
           <a:bodyPr/>
           <a:lstStyle/>
           <a:p>
+            <a:pPr marL="0" marR="0" lvl="0" indent="0" algn="l" defTabSz="914400" rtl="0" eaLnBrk="1" fontAlgn="auto" latinLnBrk="0" hangingPunct="1">
+              <a:lnSpc>
+                <a:spcPct val="100000"/>
+              </a:lnSpc>
+              <a:spcBef>
+                <a:spcPts val="0"/>
+              </a:spcBef>
+              <a:spcAft>
+                <a:spcPts val="0"/>
+              </a:spcAft>
+              <a:buClrTx/>
+              <a:buSzTx/>
+              <a:buFontTx/>
+              <a:buNone/>
+              <a:tabLst/>
+              <a:defRPr/>
+            </a:pPr>
+            <a:r>
+              <a:rPr lang="en-US" sz="1200" b="0" kern="1200" dirty="0">
+                <a:solidFill>
+                  <a:schemeClr val="tx1"/>
+                </a:solidFill>
+                <a:effectLst/>
+                <a:latin typeface="+mn-lt"/>
+                <a:ea typeface="+mn-ea"/>
+                <a:cs typeface="+mn-cs"/>
+              </a:rPr>
+              <a:t>To bring their entire operation into perspective, Wide World Importers would like to create a dashboard where they can see their KPI's derived from historical data, real-time twitter sentiment and IoT sensor data, and key product recommendations generated using machine learning.</a:t>
+            </a:r>
+          </a:p>
+          <a:p>
             <a:endParaRPr lang="en-US" dirty="0"/>
           </a:p>
         </p:txBody>
@@ -3998,7 +4114,7 @@
             <a:spLocks noGrp="1"/>
           </p:cNvSpPr>
           <p:nvPr>
-            <p:ph type="sldNum" sz="quarter" idx="10"/>
+            <p:ph type="sldNum" sz="quarter" idx="5"/>
           </p:nvPr>
         </p:nvSpPr>
         <p:spPr/>
@@ -4017,7 +4133,7 @@
     </p:spTree>
     <p:extLst>
       <p:ext uri="{BB962C8B-B14F-4D97-AF65-F5344CB8AC3E}">
-        <p14:creationId xmlns:p14="http://schemas.microsoft.com/office/powerpoint/2010/main" val="3292433888"/>
+        <p14:creationId xmlns:p14="http://schemas.microsoft.com/office/powerpoint/2010/main" val="1331600189"/>
       </p:ext>
     </p:extLst>
   </p:cSld>
@@ -4071,7 +4187,7 @@
           <a:bodyPr/>
           <a:lstStyle/>
           <a:p>
-            <a:endParaRPr lang="en-US"/>
+            <a:endParaRPr lang="en-US" dirty="0"/>
           </a:p>
         </p:txBody>
       </p:sp>
@@ -4101,7 +4217,7 @@
     </p:spTree>
     <p:extLst>
       <p:ext uri="{BB962C8B-B14F-4D97-AF65-F5344CB8AC3E}">
-        <p14:creationId xmlns:p14="http://schemas.microsoft.com/office/powerpoint/2010/main" val="1669752691"/>
+        <p14:creationId xmlns:p14="http://schemas.microsoft.com/office/powerpoint/2010/main" val="3292433888"/>
       </p:ext>
     </p:extLst>
   </p:cSld>
@@ -16706,6 +16822,191 @@
                 </a:solidFill>
                 <a:cs typeface="Segoe UI" panose="020B0502040204020203" pitchFamily="34" charset="0"/>
               </a:rPr>
+              <a:t>Customer objections</a:t>
+            </a:r>
+            <a:br>
+              <a:rPr lang="en-US" dirty="0">
+                <a:solidFill>
+                  <a:schemeClr val="tx1"/>
+                </a:solidFill>
+                <a:latin typeface="Segoe UI" panose="020B0502040204020203" pitchFamily="34" charset="0"/>
+              </a:rPr>
+            </a:br>
+            <a:endParaRPr lang="en-US" sz="3236" dirty="0">
+              <a:solidFill>
+                <a:schemeClr val="tx1"/>
+              </a:solidFill>
+              <a:latin typeface="Segoe UI" panose="020B0502040204020203" pitchFamily="34" charset="0"/>
+            </a:endParaRPr>
+          </a:p>
+        </p:txBody>
+      </p:sp>
+    </p:spTree>
+    <p:extLst>
+      <p:ext uri="{BB962C8B-B14F-4D97-AF65-F5344CB8AC3E}">
+        <p14:creationId xmlns:p14="http://schemas.microsoft.com/office/powerpoint/2010/main" val="601339970"/>
+      </p:ext>
+    </p:extLst>
+  </p:cSld>
+  <p:clrMapOvr>
+    <a:masterClrMapping/>
+  </p:clrMapOvr>
+  <mc:AlternateContent xmlns:mc="http://schemas.openxmlformats.org/markup-compatibility/2006" xmlns:p14="http://schemas.microsoft.com/office/powerpoint/2010/main">
+    <mc:Choice Requires="p14">
+      <p:transition p14:dur="0"/>
+    </mc:Choice>
+    <mc:Fallback xmlns="">
+      <p:transition/>
+    </mc:Fallback>
+  </mc:AlternateContent>
+</p:sld>
+</file>
+
+<file path=ppt/slides/slide11.xml><?xml version="1.0" encoding="utf-8"?>
+<p:sld xmlns:a="http://schemas.openxmlformats.org/drawingml/2006/main" xmlns:r="http://schemas.openxmlformats.org/officeDocument/2006/relationships" xmlns:p="http://schemas.openxmlformats.org/presentationml/2006/main">
+  <p:cSld>
+    <p:spTree>
+      <p:nvGrpSpPr>
+        <p:cNvPr id="1" name=""/>
+        <p:cNvGrpSpPr/>
+        <p:nvPr/>
+      </p:nvGrpSpPr>
+      <p:grpSpPr>
+        <a:xfrm>
+          <a:off x="0" y="0"/>
+          <a:ext cx="0" cy="0"/>
+          <a:chOff x="0" y="0"/>
+          <a:chExt cx="0" cy="0"/>
+        </a:xfrm>
+      </p:grpSpPr>
+      <p:sp>
+        <p:nvSpPr>
+          <p:cNvPr id="3" name="Content Placeholder 2"/>
+          <p:cNvSpPr>
+            <a:spLocks noGrp="1"/>
+          </p:cNvSpPr>
+          <p:nvPr>
+            <p:ph type="body" sz="quarter" idx="10"/>
+          </p:nvPr>
+        </p:nvSpPr>
+        <p:spPr/>
+        <p:txBody>
+          <a:bodyPr>
+            <a:normAutofit fontScale="92500" lnSpcReduction="10000"/>
+          </a:bodyPr>
+          <a:lstStyle/>
+          <a:p>
+            <a:r>
+              <a:rPr lang="en-US" sz="3600" dirty="0">
+                <a:solidFill>
+                  <a:schemeClr val="tx1"/>
+                </a:solidFill>
+                <a:latin typeface="+mj-lt"/>
+              </a:rPr>
+              <a:t>Main topic 1: size 36pt</a:t>
+            </a:r>
+          </a:p>
+          <a:p>
+            <a:pPr lvl="1"/>
+            <a:r>
+              <a:rPr lang="en-US" sz="2800" dirty="0">
+                <a:solidFill>
+                  <a:schemeClr val="tx1"/>
+                </a:solidFill>
+                <a:latin typeface="Segoe UI Semilight" panose="020B0402040204020203" pitchFamily="34" charset="0"/>
+                <a:cs typeface="Segoe UI Semilight" panose="020B0402040204020203" pitchFamily="34" charset="0"/>
+              </a:rPr>
+              <a:t>Size 28pt for second leve</a:t>
+            </a:r>
+            <a:r>
+              <a:rPr lang="en-US" sz="2400" dirty="0">
+                <a:solidFill>
+                  <a:schemeClr val="tx1"/>
+                </a:solidFill>
+                <a:latin typeface="Segoe UI Semilight" panose="020B0402040204020203" pitchFamily="34" charset="0"/>
+                <a:cs typeface="Segoe UI Semilight" panose="020B0402040204020203" pitchFamily="34" charset="0"/>
+              </a:rPr>
+              <a:t>l</a:t>
+            </a:r>
+          </a:p>
+          <a:p>
+            <a:pPr lvl="1"/>
+            <a:r>
+              <a:rPr lang="en-US" sz="2400" dirty="0">
+                <a:solidFill>
+                  <a:schemeClr val="tx1"/>
+                </a:solidFill>
+                <a:latin typeface="Segoe UI Semilight" panose="020B0402040204020203" pitchFamily="34" charset="0"/>
+                <a:cs typeface="Segoe UI Semilight" panose="020B0402040204020203" pitchFamily="34" charset="0"/>
+              </a:rPr>
+              <a:t>Size 24pt for third level</a:t>
+            </a:r>
+          </a:p>
+          <a:p>
+            <a:pPr lvl="1"/>
+            <a:r>
+              <a:rPr lang="en-US" sz="2200" dirty="0">
+                <a:solidFill>
+                  <a:schemeClr val="tx1"/>
+                </a:solidFill>
+                <a:latin typeface="Segoe UI Semilight" panose="020B0402040204020203" pitchFamily="34" charset="0"/>
+                <a:cs typeface="Segoe UI Semilight" panose="020B0402040204020203" pitchFamily="34" charset="0"/>
+              </a:rPr>
+              <a:t>Size 22pt for fourth level</a:t>
+            </a:r>
+          </a:p>
+          <a:p>
+            <a:pPr lvl="1"/>
+            <a:r>
+              <a:rPr lang="en-US" sz="2200" dirty="0">
+                <a:solidFill>
+                  <a:schemeClr val="tx1"/>
+                </a:solidFill>
+                <a:latin typeface="Segoe UI Semilight" panose="020B0402040204020203" pitchFamily="34" charset="0"/>
+                <a:cs typeface="Segoe UI Semilight" panose="020B0402040204020203" pitchFamily="34" charset="0"/>
+              </a:rPr>
+              <a:t>Size 22pt for fifth level</a:t>
+            </a:r>
+          </a:p>
+          <a:p>
+            <a:pPr marL="0" indent="0">
+              <a:spcAft>
+                <a:spcPts val="882"/>
+              </a:spcAft>
+              <a:buNone/>
+            </a:pPr>
+            <a:endParaRPr lang="en-US" sz="1800" dirty="0">
+              <a:solidFill>
+                <a:schemeClr val="tx1"/>
+              </a:solidFill>
+            </a:endParaRPr>
+          </a:p>
+        </p:txBody>
+      </p:sp>
+      <p:sp>
+        <p:nvSpPr>
+          <p:cNvPr id="2" name="Title 1"/>
+          <p:cNvSpPr>
+            <a:spLocks noGrp="1"/>
+          </p:cNvSpPr>
+          <p:nvPr>
+            <p:ph type="title"/>
+          </p:nvPr>
+        </p:nvSpPr>
+        <p:spPr/>
+        <p:txBody>
+          <a:bodyPr>
+            <a:normAutofit fontScale="90000"/>
+          </a:bodyPr>
+          <a:lstStyle/>
+          <a:p>
+            <a:r>
+              <a:rPr lang="en-US" sz="4900" dirty="0">
+                <a:solidFill>
+                  <a:schemeClr val="tx1"/>
+                </a:solidFill>
+                <a:cs typeface="Segoe UI" panose="020B0502040204020203" pitchFamily="34" charset="0"/>
+              </a:rPr>
               <a:t>Common scenarios</a:t>
             </a:r>
             <a:br>
@@ -16746,7 +17047,7 @@
 </p:sld>
 </file>
 
-<file path=ppt/slides/slide11.xml><?xml version="1.0" encoding="utf-8"?>
+<file path=ppt/slides/slide12.xml><?xml version="1.0" encoding="utf-8"?>
 <p:sld xmlns:a="http://schemas.openxmlformats.org/drawingml/2006/main" xmlns:r="http://schemas.openxmlformats.org/officeDocument/2006/relationships" xmlns:p="http://schemas.openxmlformats.org/presentationml/2006/main">
   <p:cSld>
     <p:spTree>
@@ -17296,7 +17597,7 @@
 </p:sld>
 </file>
 
-<file path=ppt/slides/slide12.xml><?xml version="1.0" encoding="utf-8"?>
+<file path=ppt/slides/slide13.xml><?xml version="1.0" encoding="utf-8"?>
 <p:sld xmlns:a="http://schemas.openxmlformats.org/drawingml/2006/main" xmlns:r="http://schemas.openxmlformats.org/officeDocument/2006/relationships" xmlns:p="http://schemas.openxmlformats.org/presentationml/2006/main">
   <p:cSld>
     <p:spTree>
@@ -17600,7 +17901,7 @@
 </p:sld>
 </file>
 
-<file path=ppt/slides/slide13.xml><?xml version="1.0" encoding="utf-8"?>
+<file path=ppt/slides/slide14.xml><?xml version="1.0" encoding="utf-8"?>
 <p:sld xmlns:a="http://schemas.openxmlformats.org/drawingml/2006/main" xmlns:r="http://schemas.openxmlformats.org/officeDocument/2006/relationships" xmlns:p="http://schemas.openxmlformats.org/presentationml/2006/main">
   <p:cSld>
     <p:spTree>
@@ -17791,7 +18092,7 @@
 </p:sld>
 </file>
 
-<file path=ppt/slides/slide14.xml><?xml version="1.0" encoding="utf-8"?>
+<file path=ppt/slides/slide15.xml><?xml version="1.0" encoding="utf-8"?>
 <p:sld xmlns:a="http://schemas.openxmlformats.org/drawingml/2006/main" xmlns:r="http://schemas.openxmlformats.org/officeDocument/2006/relationships" xmlns:p="http://schemas.openxmlformats.org/presentationml/2006/main">
   <p:cSld>
     <p:bg>
@@ -17967,191 +18268,6 @@
     <p:extLst>
       <p:ext uri="{BB962C8B-B14F-4D97-AF65-F5344CB8AC3E}">
         <p14:creationId xmlns:p14="http://schemas.microsoft.com/office/powerpoint/2010/main" val="586155173"/>
-      </p:ext>
-    </p:extLst>
-  </p:cSld>
-  <p:clrMapOvr>
-    <a:masterClrMapping/>
-  </p:clrMapOvr>
-  <mc:AlternateContent xmlns:mc="http://schemas.openxmlformats.org/markup-compatibility/2006" xmlns:p14="http://schemas.microsoft.com/office/powerpoint/2010/main">
-    <mc:Choice Requires="p14">
-      <p:transition p14:dur="0"/>
-    </mc:Choice>
-    <mc:Fallback xmlns="">
-      <p:transition/>
-    </mc:Fallback>
-  </mc:AlternateContent>
-</p:sld>
-</file>
-
-<file path=ppt/slides/slide15.xml><?xml version="1.0" encoding="utf-8"?>
-<p:sld xmlns:a="http://schemas.openxmlformats.org/drawingml/2006/main" xmlns:r="http://schemas.openxmlformats.org/officeDocument/2006/relationships" xmlns:p="http://schemas.openxmlformats.org/presentationml/2006/main">
-  <p:cSld>
-    <p:spTree>
-      <p:nvGrpSpPr>
-        <p:cNvPr id="1" name=""/>
-        <p:cNvGrpSpPr/>
-        <p:nvPr/>
-      </p:nvGrpSpPr>
-      <p:grpSpPr>
-        <a:xfrm>
-          <a:off x="0" y="0"/>
-          <a:ext cx="0" cy="0"/>
-          <a:chOff x="0" y="0"/>
-          <a:chExt cx="0" cy="0"/>
-        </a:xfrm>
-      </p:grpSpPr>
-      <p:sp>
-        <p:nvSpPr>
-          <p:cNvPr id="3" name="Content Placeholder 2"/>
-          <p:cNvSpPr>
-            <a:spLocks noGrp="1"/>
-          </p:cNvSpPr>
-          <p:nvPr>
-            <p:ph type="body" sz="quarter" idx="10"/>
-          </p:nvPr>
-        </p:nvSpPr>
-        <p:spPr/>
-        <p:txBody>
-          <a:bodyPr>
-            <a:normAutofit fontScale="92500" lnSpcReduction="10000"/>
-          </a:bodyPr>
-          <a:lstStyle/>
-          <a:p>
-            <a:r>
-              <a:rPr lang="en-US" sz="3600" dirty="0">
-                <a:solidFill>
-                  <a:schemeClr val="tx1"/>
-                </a:solidFill>
-                <a:latin typeface="+mj-lt"/>
-              </a:rPr>
-              <a:t>Main topic 1: size 36pt</a:t>
-            </a:r>
-          </a:p>
-          <a:p>
-            <a:pPr lvl="1"/>
-            <a:r>
-              <a:rPr lang="en-US" sz="2800" dirty="0">
-                <a:solidFill>
-                  <a:schemeClr val="tx1"/>
-                </a:solidFill>
-                <a:latin typeface="Segoe UI Semilight" panose="020B0402040204020203" pitchFamily="34" charset="0"/>
-                <a:cs typeface="Segoe UI Semilight" panose="020B0402040204020203" pitchFamily="34" charset="0"/>
-              </a:rPr>
-              <a:t>Size 28pt for second leve</a:t>
-            </a:r>
-            <a:r>
-              <a:rPr lang="en-US" sz="2400" dirty="0">
-                <a:solidFill>
-                  <a:schemeClr val="tx1"/>
-                </a:solidFill>
-                <a:latin typeface="Segoe UI Semilight" panose="020B0402040204020203" pitchFamily="34" charset="0"/>
-                <a:cs typeface="Segoe UI Semilight" panose="020B0402040204020203" pitchFamily="34" charset="0"/>
-              </a:rPr>
-              <a:t>l</a:t>
-            </a:r>
-          </a:p>
-          <a:p>
-            <a:pPr lvl="1"/>
-            <a:r>
-              <a:rPr lang="en-US" sz="2400" dirty="0">
-                <a:solidFill>
-                  <a:schemeClr val="tx1"/>
-                </a:solidFill>
-                <a:latin typeface="Segoe UI Semilight" panose="020B0402040204020203" pitchFamily="34" charset="0"/>
-                <a:cs typeface="Segoe UI Semilight" panose="020B0402040204020203" pitchFamily="34" charset="0"/>
-              </a:rPr>
-              <a:t>Size 24pt for third level</a:t>
-            </a:r>
-          </a:p>
-          <a:p>
-            <a:pPr lvl="1"/>
-            <a:r>
-              <a:rPr lang="en-US" sz="2200" dirty="0">
-                <a:solidFill>
-                  <a:schemeClr val="tx1"/>
-                </a:solidFill>
-                <a:latin typeface="Segoe UI Semilight" panose="020B0402040204020203" pitchFamily="34" charset="0"/>
-                <a:cs typeface="Segoe UI Semilight" panose="020B0402040204020203" pitchFamily="34" charset="0"/>
-              </a:rPr>
-              <a:t>Size 22pt for fourth level</a:t>
-            </a:r>
-          </a:p>
-          <a:p>
-            <a:pPr lvl="1"/>
-            <a:r>
-              <a:rPr lang="en-US" sz="2200" dirty="0">
-                <a:solidFill>
-                  <a:schemeClr val="tx1"/>
-                </a:solidFill>
-                <a:latin typeface="Segoe UI Semilight" panose="020B0402040204020203" pitchFamily="34" charset="0"/>
-                <a:cs typeface="Segoe UI Semilight" panose="020B0402040204020203" pitchFamily="34" charset="0"/>
-              </a:rPr>
-              <a:t>Size 22pt for fifth level</a:t>
-            </a:r>
-          </a:p>
-          <a:p>
-            <a:pPr marL="0" indent="0">
-              <a:spcAft>
-                <a:spcPts val="882"/>
-              </a:spcAft>
-              <a:buNone/>
-            </a:pPr>
-            <a:endParaRPr lang="en-US" sz="1800" dirty="0">
-              <a:solidFill>
-                <a:schemeClr val="tx1"/>
-              </a:solidFill>
-            </a:endParaRPr>
-          </a:p>
-        </p:txBody>
-      </p:sp>
-      <p:sp>
-        <p:nvSpPr>
-          <p:cNvPr id="2" name="Title 1"/>
-          <p:cNvSpPr>
-            <a:spLocks noGrp="1"/>
-          </p:cNvSpPr>
-          <p:nvPr>
-            <p:ph type="title"/>
-          </p:nvPr>
-        </p:nvSpPr>
-        <p:spPr/>
-        <p:txBody>
-          <a:bodyPr>
-            <a:normAutofit fontScale="90000"/>
-          </a:bodyPr>
-          <a:lstStyle/>
-          <a:p>
-            <a:r>
-              <a:rPr lang="en-US" sz="4900" dirty="0">
-                <a:solidFill>
-                  <a:schemeClr val="tx1"/>
-                </a:solidFill>
-                <a:cs typeface="Segoe UI" panose="020B0502040204020203" pitchFamily="34" charset="0"/>
-              </a:rPr>
-              <a:t>Preferred solution</a:t>
-            </a:r>
-            <a:br>
-              <a:rPr lang="en-US" dirty="0">
-                <a:solidFill>
-                  <a:schemeClr val="tx1"/>
-                </a:solidFill>
-                <a:latin typeface="Segoe UI" panose="020B0502040204020203" pitchFamily="34" charset="0"/>
-              </a:rPr>
-            </a:br>
-            <a:endParaRPr lang="en-US" sz="3236" dirty="0">
-              <a:solidFill>
-                <a:schemeClr val="tx1"/>
-              </a:solidFill>
-              <a:latin typeface="Segoe UI" panose="020B0502040204020203" pitchFamily="34" charset="0"/>
-            </a:endParaRPr>
-          </a:p>
-        </p:txBody>
-      </p:sp>
-    </p:spTree>
-    <p:extLst>
-      <p:ext uri="{BB962C8B-B14F-4D97-AF65-F5344CB8AC3E}">
-        <p14:creationId xmlns:p14="http://schemas.microsoft.com/office/powerpoint/2010/main" val="2547985055"/>
       </p:ext>
     </p:extLst>
   </p:cSld>
@@ -18314,7 +18430,7 @@
                 </a:solidFill>
                 <a:cs typeface="Segoe UI" panose="020B0502040204020203" pitchFamily="34" charset="0"/>
               </a:rPr>
-              <a:t>Preferred objections handling</a:t>
+              <a:t>Preferred solution</a:t>
             </a:r>
             <a:br>
               <a:rPr lang="en-US" dirty="0">
@@ -18336,7 +18452,7 @@
     </p:spTree>
     <p:extLst>
       <p:ext uri="{BB962C8B-B14F-4D97-AF65-F5344CB8AC3E}">
-        <p14:creationId xmlns:p14="http://schemas.microsoft.com/office/powerpoint/2010/main" val="2371438961"/>
+        <p14:creationId xmlns:p14="http://schemas.microsoft.com/office/powerpoint/2010/main" val="2547985055"/>
       </p:ext>
     </p:extLst>
   </p:cSld>
@@ -18499,6 +18615,191 @@
                 </a:solidFill>
                 <a:cs typeface="Segoe UI" panose="020B0502040204020203" pitchFamily="34" charset="0"/>
               </a:rPr>
+              <a:t>Preferred objections handling</a:t>
+            </a:r>
+            <a:br>
+              <a:rPr lang="en-US" dirty="0">
+                <a:solidFill>
+                  <a:schemeClr val="tx1"/>
+                </a:solidFill>
+                <a:latin typeface="Segoe UI" panose="020B0502040204020203" pitchFamily="34" charset="0"/>
+              </a:rPr>
+            </a:br>
+            <a:endParaRPr lang="en-US" sz="3236" dirty="0">
+              <a:solidFill>
+                <a:schemeClr val="tx1"/>
+              </a:solidFill>
+              <a:latin typeface="Segoe UI" panose="020B0502040204020203" pitchFamily="34" charset="0"/>
+            </a:endParaRPr>
+          </a:p>
+        </p:txBody>
+      </p:sp>
+    </p:spTree>
+    <p:extLst>
+      <p:ext uri="{BB962C8B-B14F-4D97-AF65-F5344CB8AC3E}">
+        <p14:creationId xmlns:p14="http://schemas.microsoft.com/office/powerpoint/2010/main" val="2371438961"/>
+      </p:ext>
+    </p:extLst>
+  </p:cSld>
+  <p:clrMapOvr>
+    <a:masterClrMapping/>
+  </p:clrMapOvr>
+  <mc:AlternateContent xmlns:mc="http://schemas.openxmlformats.org/markup-compatibility/2006" xmlns:p14="http://schemas.microsoft.com/office/powerpoint/2010/main">
+    <mc:Choice Requires="p14">
+      <p:transition p14:dur="0"/>
+    </mc:Choice>
+    <mc:Fallback xmlns="">
+      <p:transition/>
+    </mc:Fallback>
+  </mc:AlternateContent>
+</p:sld>
+</file>
+
+<file path=ppt/slides/slide18.xml><?xml version="1.0" encoding="utf-8"?>
+<p:sld xmlns:a="http://schemas.openxmlformats.org/drawingml/2006/main" xmlns:r="http://schemas.openxmlformats.org/officeDocument/2006/relationships" xmlns:p="http://schemas.openxmlformats.org/presentationml/2006/main">
+  <p:cSld>
+    <p:spTree>
+      <p:nvGrpSpPr>
+        <p:cNvPr id="1" name=""/>
+        <p:cNvGrpSpPr/>
+        <p:nvPr/>
+      </p:nvGrpSpPr>
+      <p:grpSpPr>
+        <a:xfrm>
+          <a:off x="0" y="0"/>
+          <a:ext cx="0" cy="0"/>
+          <a:chOff x="0" y="0"/>
+          <a:chExt cx="0" cy="0"/>
+        </a:xfrm>
+      </p:grpSpPr>
+      <p:sp>
+        <p:nvSpPr>
+          <p:cNvPr id="3" name="Content Placeholder 2"/>
+          <p:cNvSpPr>
+            <a:spLocks noGrp="1"/>
+          </p:cNvSpPr>
+          <p:nvPr>
+            <p:ph type="body" sz="quarter" idx="10"/>
+          </p:nvPr>
+        </p:nvSpPr>
+        <p:spPr/>
+        <p:txBody>
+          <a:bodyPr>
+            <a:normAutofit fontScale="92500" lnSpcReduction="10000"/>
+          </a:bodyPr>
+          <a:lstStyle/>
+          <a:p>
+            <a:r>
+              <a:rPr lang="en-US" sz="3600" dirty="0">
+                <a:solidFill>
+                  <a:schemeClr val="tx1"/>
+                </a:solidFill>
+                <a:latin typeface="+mj-lt"/>
+              </a:rPr>
+              <a:t>Main topic 1: size 36pt</a:t>
+            </a:r>
+          </a:p>
+          <a:p>
+            <a:pPr lvl="1"/>
+            <a:r>
+              <a:rPr lang="en-US" sz="2800" dirty="0">
+                <a:solidFill>
+                  <a:schemeClr val="tx1"/>
+                </a:solidFill>
+                <a:latin typeface="Segoe UI Semilight" panose="020B0402040204020203" pitchFamily="34" charset="0"/>
+                <a:cs typeface="Segoe UI Semilight" panose="020B0402040204020203" pitchFamily="34" charset="0"/>
+              </a:rPr>
+              <a:t>Size 28pt for second leve</a:t>
+            </a:r>
+            <a:r>
+              <a:rPr lang="en-US" sz="2400" dirty="0">
+                <a:solidFill>
+                  <a:schemeClr val="tx1"/>
+                </a:solidFill>
+                <a:latin typeface="Segoe UI Semilight" panose="020B0402040204020203" pitchFamily="34" charset="0"/>
+                <a:cs typeface="Segoe UI Semilight" panose="020B0402040204020203" pitchFamily="34" charset="0"/>
+              </a:rPr>
+              <a:t>l</a:t>
+            </a:r>
+          </a:p>
+          <a:p>
+            <a:pPr lvl="1"/>
+            <a:r>
+              <a:rPr lang="en-US" sz="2400" dirty="0">
+                <a:solidFill>
+                  <a:schemeClr val="tx1"/>
+                </a:solidFill>
+                <a:latin typeface="Segoe UI Semilight" panose="020B0402040204020203" pitchFamily="34" charset="0"/>
+                <a:cs typeface="Segoe UI Semilight" panose="020B0402040204020203" pitchFamily="34" charset="0"/>
+              </a:rPr>
+              <a:t>Size 24pt for third level</a:t>
+            </a:r>
+          </a:p>
+          <a:p>
+            <a:pPr lvl="1"/>
+            <a:r>
+              <a:rPr lang="en-US" sz="2200" dirty="0">
+                <a:solidFill>
+                  <a:schemeClr val="tx1"/>
+                </a:solidFill>
+                <a:latin typeface="Segoe UI Semilight" panose="020B0402040204020203" pitchFamily="34" charset="0"/>
+                <a:cs typeface="Segoe UI Semilight" panose="020B0402040204020203" pitchFamily="34" charset="0"/>
+              </a:rPr>
+              <a:t>Size 22pt for fourth level</a:t>
+            </a:r>
+          </a:p>
+          <a:p>
+            <a:pPr lvl="1"/>
+            <a:r>
+              <a:rPr lang="en-US" sz="2200" dirty="0">
+                <a:solidFill>
+                  <a:schemeClr val="tx1"/>
+                </a:solidFill>
+                <a:latin typeface="Segoe UI Semilight" panose="020B0402040204020203" pitchFamily="34" charset="0"/>
+                <a:cs typeface="Segoe UI Semilight" panose="020B0402040204020203" pitchFamily="34" charset="0"/>
+              </a:rPr>
+              <a:t>Size 22pt for fifth level</a:t>
+            </a:r>
+          </a:p>
+          <a:p>
+            <a:pPr marL="0" indent="0">
+              <a:spcAft>
+                <a:spcPts val="882"/>
+              </a:spcAft>
+              <a:buNone/>
+            </a:pPr>
+            <a:endParaRPr lang="en-US" sz="1800" dirty="0">
+              <a:solidFill>
+                <a:schemeClr val="tx1"/>
+              </a:solidFill>
+            </a:endParaRPr>
+          </a:p>
+        </p:txBody>
+      </p:sp>
+      <p:sp>
+        <p:nvSpPr>
+          <p:cNvPr id="2" name="Title 1"/>
+          <p:cNvSpPr>
+            <a:spLocks noGrp="1"/>
+          </p:cNvSpPr>
+          <p:nvPr>
+            <p:ph type="title"/>
+          </p:nvPr>
+        </p:nvSpPr>
+        <p:spPr/>
+        <p:txBody>
+          <a:bodyPr>
+            <a:normAutofit fontScale="90000"/>
+          </a:bodyPr>
+          <a:lstStyle/>
+          <a:p>
+            <a:r>
+              <a:rPr lang="en-US" sz="4900" dirty="0">
+                <a:solidFill>
+                  <a:schemeClr val="tx1"/>
+                </a:solidFill>
+                <a:cs typeface="Segoe UI" panose="020B0502040204020203" pitchFamily="34" charset="0"/>
+              </a:rPr>
               <a:t>Customer quote</a:t>
             </a:r>
             <a:br>
@@ -18539,7 +18840,7 @@
 </p:sld>
 </file>
 
-<file path=ppt/slides/slide18.xml><?xml version="1.0" encoding="utf-8"?>
+<file path=ppt/slides/slide19.xml><?xml version="1.0" encoding="utf-8"?>
 <p:sld xmlns:a="http://schemas.openxmlformats.org/drawingml/2006/main" xmlns:r="http://schemas.openxmlformats.org/officeDocument/2006/relationships" xmlns:p="http://schemas.openxmlformats.org/presentationml/2006/main">
   <p:cSld>
     <p:bg>
@@ -18568,157 +18869,6 @@
     <p:extLst>
       <p:ext uri="{BB962C8B-B14F-4D97-AF65-F5344CB8AC3E}">
         <p14:creationId xmlns:p14="http://schemas.microsoft.com/office/powerpoint/2010/main" val="1897784522"/>
-      </p:ext>
-    </p:extLst>
-  </p:cSld>
-  <p:clrMapOvr>
-    <a:masterClrMapping/>
-  </p:clrMapOvr>
-  <mc:AlternateContent xmlns:mc="http://schemas.openxmlformats.org/markup-compatibility/2006" xmlns:p14="http://schemas.microsoft.com/office/powerpoint/2010/main">
-    <mc:Choice Requires="p14">
-      <p:transition spd="med" p14:dur="700">
-        <p:fade/>
-      </p:transition>
-    </mc:Choice>
-    <mc:Fallback xmlns="">
-      <p:transition spd="med">
-        <p:fade/>
-      </p:transition>
-    </mc:Fallback>
-  </mc:AlternateContent>
-</p:sld>
-</file>
-
-<file path=ppt/slides/slide19.xml><?xml version="1.0" encoding="utf-8"?>
-<p:sld xmlns:a="http://schemas.openxmlformats.org/drawingml/2006/main" xmlns:r="http://schemas.openxmlformats.org/officeDocument/2006/relationships" xmlns:p="http://schemas.openxmlformats.org/presentationml/2006/main">
-  <p:cSld>
-    <p:spTree>
-      <p:nvGrpSpPr>
-        <p:cNvPr id="1" name=""/>
-        <p:cNvGrpSpPr/>
-        <p:nvPr/>
-      </p:nvGrpSpPr>
-      <p:grpSpPr>
-        <a:xfrm>
-          <a:off x="0" y="0"/>
-          <a:ext cx="0" cy="0"/>
-          <a:chOff x="0" y="0"/>
-          <a:chExt cx="0" cy="0"/>
-        </a:xfrm>
-      </p:grpSpPr>
-      <p:sp>
-        <p:nvSpPr>
-          <p:cNvPr id="6" name="Text Placeholder 5"/>
-          <p:cNvSpPr>
-            <a:spLocks noGrp="1"/>
-          </p:cNvSpPr>
-          <p:nvPr>
-            <p:ph type="body" sz="quarter" idx="10"/>
-          </p:nvPr>
-        </p:nvSpPr>
-        <p:spPr>
-          <a:xfrm>
-            <a:off x="269239" y="1189177"/>
-            <a:ext cx="11653523" cy="2387192"/>
-          </a:xfrm>
-        </p:spPr>
-        <p:txBody>
-          <a:bodyPr/>
-          <a:lstStyle/>
-          <a:p>
-            <a:r>
-              <a:rPr lang="en-US" dirty="0">
-                <a:solidFill>
-                  <a:schemeClr val="tx1"/>
-                </a:solidFill>
-              </a:rPr>
-              <a:t>Main topic 1: size 36pt</a:t>
-            </a:r>
-          </a:p>
-          <a:p>
-            <a:pPr lvl="1"/>
-            <a:r>
-              <a:rPr lang="en-US" dirty="0">
-                <a:solidFill>
-                  <a:schemeClr val="tx1"/>
-                </a:solidFill>
-              </a:rPr>
-              <a:t>Size 28pt for second level</a:t>
-            </a:r>
-          </a:p>
-          <a:p>
-            <a:pPr lvl="2"/>
-            <a:r>
-              <a:rPr lang="en-US" dirty="0">
-                <a:solidFill>
-                  <a:schemeClr val="tx1"/>
-                </a:solidFill>
-              </a:rPr>
-              <a:t>Size 24pt for third level</a:t>
-            </a:r>
-          </a:p>
-          <a:p>
-            <a:pPr lvl="3"/>
-            <a:r>
-              <a:rPr lang="en-US" dirty="0">
-                <a:solidFill>
-                  <a:schemeClr val="tx1"/>
-                </a:solidFill>
-              </a:rPr>
-              <a:t>Size 22pt for fourth level</a:t>
-            </a:r>
-          </a:p>
-          <a:p>
-            <a:pPr lvl="4"/>
-            <a:r>
-              <a:rPr lang="en-US" dirty="0">
-                <a:solidFill>
-                  <a:schemeClr val="tx1"/>
-                </a:solidFill>
-              </a:rPr>
-              <a:t>Size 22 for fifth level</a:t>
-            </a:r>
-          </a:p>
-          <a:p>
-            <a:pPr lvl="2"/>
-            <a:endParaRPr lang="en-US" dirty="0">
-              <a:solidFill>
-                <a:schemeClr val="tx1"/>
-              </a:solidFill>
-            </a:endParaRPr>
-          </a:p>
-        </p:txBody>
-      </p:sp>
-      <p:sp>
-        <p:nvSpPr>
-          <p:cNvPr id="17" name="Title 16"/>
-          <p:cNvSpPr>
-            <a:spLocks noGrp="1"/>
-          </p:cNvSpPr>
-          <p:nvPr>
-            <p:ph type="title"/>
-          </p:nvPr>
-        </p:nvSpPr>
-        <p:spPr/>
-        <p:txBody>
-          <a:bodyPr/>
-          <a:lstStyle/>
-          <a:p>
-            <a:r>
-              <a:rPr lang="en-US" dirty="0">
-                <a:solidFill>
-                  <a:schemeClr val="tx1"/>
-                </a:solidFill>
-              </a:rPr>
-              <a:t>Text layout (without bullet points)</a:t>
-            </a:r>
-          </a:p>
-        </p:txBody>
-      </p:sp>
-    </p:spTree>
-    <p:extLst>
-      <p:ext uri="{BB962C8B-B14F-4D97-AF65-F5344CB8AC3E}">
-        <p14:creationId xmlns:p14="http://schemas.microsoft.com/office/powerpoint/2010/main" val="4234473174"/>
       </p:ext>
     </p:extLst>
   </p:cSld>
@@ -18981,6 +19131,157 @@
 </file>
 
 <file path=ppt/slides/slide20.xml><?xml version="1.0" encoding="utf-8"?>
+<p:sld xmlns:a="http://schemas.openxmlformats.org/drawingml/2006/main" xmlns:r="http://schemas.openxmlformats.org/officeDocument/2006/relationships" xmlns:p="http://schemas.openxmlformats.org/presentationml/2006/main">
+  <p:cSld>
+    <p:spTree>
+      <p:nvGrpSpPr>
+        <p:cNvPr id="1" name=""/>
+        <p:cNvGrpSpPr/>
+        <p:nvPr/>
+      </p:nvGrpSpPr>
+      <p:grpSpPr>
+        <a:xfrm>
+          <a:off x="0" y="0"/>
+          <a:ext cx="0" cy="0"/>
+          <a:chOff x="0" y="0"/>
+          <a:chExt cx="0" cy="0"/>
+        </a:xfrm>
+      </p:grpSpPr>
+      <p:sp>
+        <p:nvSpPr>
+          <p:cNvPr id="6" name="Text Placeholder 5"/>
+          <p:cNvSpPr>
+            <a:spLocks noGrp="1"/>
+          </p:cNvSpPr>
+          <p:nvPr>
+            <p:ph type="body" sz="quarter" idx="10"/>
+          </p:nvPr>
+        </p:nvSpPr>
+        <p:spPr>
+          <a:xfrm>
+            <a:off x="269239" y="1189177"/>
+            <a:ext cx="11653523" cy="2387192"/>
+          </a:xfrm>
+        </p:spPr>
+        <p:txBody>
+          <a:bodyPr/>
+          <a:lstStyle/>
+          <a:p>
+            <a:r>
+              <a:rPr lang="en-US" dirty="0">
+                <a:solidFill>
+                  <a:schemeClr val="tx1"/>
+                </a:solidFill>
+              </a:rPr>
+              <a:t>Main topic 1: size 36pt</a:t>
+            </a:r>
+          </a:p>
+          <a:p>
+            <a:pPr lvl="1"/>
+            <a:r>
+              <a:rPr lang="en-US" dirty="0">
+                <a:solidFill>
+                  <a:schemeClr val="tx1"/>
+                </a:solidFill>
+              </a:rPr>
+              <a:t>Size 28pt for second level</a:t>
+            </a:r>
+          </a:p>
+          <a:p>
+            <a:pPr lvl="2"/>
+            <a:r>
+              <a:rPr lang="en-US" dirty="0">
+                <a:solidFill>
+                  <a:schemeClr val="tx1"/>
+                </a:solidFill>
+              </a:rPr>
+              <a:t>Size 24pt for third level</a:t>
+            </a:r>
+          </a:p>
+          <a:p>
+            <a:pPr lvl="3"/>
+            <a:r>
+              <a:rPr lang="en-US" dirty="0">
+                <a:solidFill>
+                  <a:schemeClr val="tx1"/>
+                </a:solidFill>
+              </a:rPr>
+              <a:t>Size 22pt for fourth level</a:t>
+            </a:r>
+          </a:p>
+          <a:p>
+            <a:pPr lvl="4"/>
+            <a:r>
+              <a:rPr lang="en-US" dirty="0">
+                <a:solidFill>
+                  <a:schemeClr val="tx1"/>
+                </a:solidFill>
+              </a:rPr>
+              <a:t>Size 22 for fifth level</a:t>
+            </a:r>
+          </a:p>
+          <a:p>
+            <a:pPr lvl="2"/>
+            <a:endParaRPr lang="en-US" dirty="0">
+              <a:solidFill>
+                <a:schemeClr val="tx1"/>
+              </a:solidFill>
+            </a:endParaRPr>
+          </a:p>
+        </p:txBody>
+      </p:sp>
+      <p:sp>
+        <p:nvSpPr>
+          <p:cNvPr id="17" name="Title 16"/>
+          <p:cNvSpPr>
+            <a:spLocks noGrp="1"/>
+          </p:cNvSpPr>
+          <p:nvPr>
+            <p:ph type="title"/>
+          </p:nvPr>
+        </p:nvSpPr>
+        <p:spPr/>
+        <p:txBody>
+          <a:bodyPr/>
+          <a:lstStyle/>
+          <a:p>
+            <a:r>
+              <a:rPr lang="en-US" dirty="0">
+                <a:solidFill>
+                  <a:schemeClr val="tx1"/>
+                </a:solidFill>
+              </a:rPr>
+              <a:t>Text layout (without bullet points)</a:t>
+            </a:r>
+          </a:p>
+        </p:txBody>
+      </p:sp>
+    </p:spTree>
+    <p:extLst>
+      <p:ext uri="{BB962C8B-B14F-4D97-AF65-F5344CB8AC3E}">
+        <p14:creationId xmlns:p14="http://schemas.microsoft.com/office/powerpoint/2010/main" val="4234473174"/>
+      </p:ext>
+    </p:extLst>
+  </p:cSld>
+  <p:clrMapOvr>
+    <a:masterClrMapping/>
+  </p:clrMapOvr>
+  <mc:AlternateContent xmlns:mc="http://schemas.openxmlformats.org/markup-compatibility/2006" xmlns:p14="http://schemas.microsoft.com/office/powerpoint/2010/main">
+    <mc:Choice Requires="p14">
+      <p:transition spd="med" p14:dur="700">
+        <p:fade/>
+      </p:transition>
+    </mc:Choice>
+    <mc:Fallback xmlns="">
+      <p:transition spd="med">
+        <p:fade/>
+      </p:transition>
+    </mc:Fallback>
+  </mc:AlternateContent>
+</p:sld>
+</file>
+
+<file path=ppt/slides/slide21.xml><?xml version="1.0" encoding="utf-8"?>
 <p:sld xmlns:a="http://schemas.openxmlformats.org/drawingml/2006/main" xmlns:r="http://schemas.openxmlformats.org/officeDocument/2006/relationships" xmlns:p="http://schemas.openxmlformats.org/presentationml/2006/main">
   <p:cSld>
     <p:spTree>
@@ -19388,183 +19689,6 @@
 </p:sld>
 </file>
 
-<file path=ppt/slides/slide21.xml><?xml version="1.0" encoding="utf-8"?>
-<p:sld xmlns:a="http://schemas.openxmlformats.org/drawingml/2006/main" xmlns:r="http://schemas.openxmlformats.org/officeDocument/2006/relationships" xmlns:p="http://schemas.openxmlformats.org/presentationml/2006/main">
-  <p:cSld>
-    <p:spTree>
-      <p:nvGrpSpPr>
-        <p:cNvPr id="1" name=""/>
-        <p:cNvGrpSpPr/>
-        <p:nvPr/>
-      </p:nvGrpSpPr>
-      <p:grpSpPr>
-        <a:xfrm>
-          <a:off x="0" y="0"/>
-          <a:ext cx="0" cy="0"/>
-          <a:chOff x="0" y="0"/>
-          <a:chExt cx="0" cy="0"/>
-        </a:xfrm>
-      </p:grpSpPr>
-      <p:sp>
-        <p:nvSpPr>
-          <p:cNvPr id="3" name="Text Placeholder 2"/>
-          <p:cNvSpPr>
-            <a:spLocks noGrp="1"/>
-          </p:cNvSpPr>
-          <p:nvPr>
-            <p:ph type="body" sz="quarter" idx="4294967295"/>
-          </p:nvPr>
-        </p:nvSpPr>
-        <p:spPr>
-          <a:xfrm>
-            <a:off x="0" y="1793875"/>
-            <a:ext cx="11652250" cy="2586157"/>
-          </a:xfrm>
-        </p:spPr>
-        <p:txBody>
-          <a:bodyPr/>
-          <a:lstStyle/>
-          <a:p>
-            <a:r>
-              <a:rPr lang="en-US" dirty="0">
-                <a:solidFill>
-                  <a:schemeClr val="tx1"/>
-                </a:solidFill>
-              </a:rPr>
-              <a:t>Example of a bulleted slide with a subhead</a:t>
-            </a:r>
-          </a:p>
-          <a:p>
-            <a:pPr lvl="1"/>
-            <a:r>
-              <a:rPr lang="en-US" dirty="0">
-                <a:solidFill>
-                  <a:schemeClr val="tx1"/>
-                </a:solidFill>
-              </a:rPr>
-              <a:t>Set the slide title to “Sentence case”</a:t>
-            </a:r>
-          </a:p>
-          <a:p>
-            <a:pPr lvl="1"/>
-            <a:r>
-              <a:rPr lang="en-US" dirty="0">
-                <a:solidFill>
-                  <a:schemeClr val="tx1"/>
-                </a:solidFill>
-              </a:rPr>
-              <a:t>Set subheads to “Sentence case”</a:t>
-            </a:r>
-          </a:p>
-          <a:p>
-            <a:pPr lvl="0"/>
-            <a:r>
-              <a:rPr lang="en-US" dirty="0">
-                <a:solidFill>
-                  <a:schemeClr val="tx1"/>
-                </a:solidFill>
-              </a:rPr>
-              <a:t>Hyperlink style</a:t>
-            </a:r>
-          </a:p>
-          <a:p>
-            <a:pPr lvl="1"/>
-            <a:r>
-              <a:rPr lang="en-US" dirty="0">
-                <a:solidFill>
-                  <a:schemeClr val="tx1"/>
-                </a:solidFill>
-                <a:hlinkClick r:id="rId3"/>
-              </a:rPr>
-              <a:t>www.microsoft.com</a:t>
-            </a:r>
-            <a:r>
-              <a:rPr lang="en-US" dirty="0">
-                <a:solidFill>
-                  <a:schemeClr val="tx1"/>
-                </a:solidFill>
-              </a:rPr>
-              <a:t> </a:t>
-            </a:r>
-          </a:p>
-        </p:txBody>
-      </p:sp>
-      <p:sp>
-        <p:nvSpPr>
-          <p:cNvPr id="2" name="Title 1"/>
-          <p:cNvSpPr>
-            <a:spLocks noGrp="1"/>
-          </p:cNvSpPr>
-          <p:nvPr>
-            <p:ph type="title" idx="4294967295"/>
-          </p:nvPr>
-        </p:nvSpPr>
-        <p:spPr>
-          <a:xfrm>
-            <a:off x="534988" y="290513"/>
-            <a:ext cx="11657012" cy="900112"/>
-          </a:xfrm>
-        </p:spPr>
-        <p:txBody>
-          <a:bodyPr/>
-          <a:lstStyle/>
-          <a:p>
-            <a:r>
-              <a:rPr lang="en-US" dirty="0">
-                <a:solidFill>
-                  <a:schemeClr val="tx1"/>
-                </a:solidFill>
-              </a:rPr>
-              <a:t>Bullet points layout with subtitle</a:t>
-            </a:r>
-            <a:br>
-              <a:rPr lang="en-US" dirty="0">
-                <a:solidFill>
-                  <a:schemeClr val="tx1"/>
-                </a:solidFill>
-              </a:rPr>
-            </a:br>
-            <a:r>
-              <a:rPr lang="en-US" sz="3529" dirty="0">
-                <a:solidFill>
-                  <a:schemeClr val="tx1"/>
-                </a:solidFill>
-              </a:rPr>
-              <a:t>Subtitle is smaller in the same text block</a:t>
-            </a:r>
-            <a:endParaRPr lang="en-US" sz="3921" dirty="0">
-              <a:solidFill>
-                <a:schemeClr val="tx1"/>
-              </a:solidFill>
-            </a:endParaRPr>
-          </a:p>
-        </p:txBody>
-      </p:sp>
-    </p:spTree>
-    <p:extLst>
-      <p:ext uri="{BB962C8B-B14F-4D97-AF65-F5344CB8AC3E}">
-        <p14:creationId xmlns:p14="http://schemas.microsoft.com/office/powerpoint/2010/main" val="3887587415"/>
-      </p:ext>
-    </p:extLst>
-  </p:cSld>
-  <p:clrMapOvr>
-    <a:masterClrMapping/>
-  </p:clrMapOvr>
-  <mc:AlternateContent xmlns:mc="http://schemas.openxmlformats.org/markup-compatibility/2006" xmlns:p14="http://schemas.microsoft.com/office/powerpoint/2010/main">
-    <mc:Choice Requires="p14">
-      <p:transition spd="med" p14:dur="700">
-        <p:fade/>
-      </p:transition>
-    </mc:Choice>
-    <mc:Fallback xmlns="">
-      <p:transition spd="med">
-        <p:fade/>
-      </p:transition>
-    </mc:Fallback>
-  </mc:AlternateContent>
-</p:sld>
-</file>
-
 <file path=ppt/slides/slide22.xml><?xml version="1.0" encoding="utf-8"?>
 <p:sld xmlns:a="http://schemas.openxmlformats.org/drawingml/2006/main" xmlns:r="http://schemas.openxmlformats.org/officeDocument/2006/relationships" xmlns:p="http://schemas.openxmlformats.org/presentationml/2006/main">
   <p:cSld>
@@ -19584,18 +19708,18 @@
       </p:grpSpPr>
       <p:sp>
         <p:nvSpPr>
-          <p:cNvPr id="2" name="Title 1"/>
+          <p:cNvPr id="3" name="Text Placeholder 2"/>
           <p:cNvSpPr>
             <a:spLocks noGrp="1"/>
           </p:cNvSpPr>
           <p:nvPr>
-            <p:ph type="title"/>
+            <p:ph type="body" sz="quarter" idx="4294967295"/>
           </p:nvPr>
         </p:nvSpPr>
         <p:spPr>
           <a:xfrm>
-            <a:off x="269240" y="3010840"/>
-            <a:ext cx="4795873" cy="836319"/>
+            <a:off x="0" y="1793875"/>
+            <a:ext cx="11652250" cy="2586157"/>
           </a:xfrm>
         </p:spPr>
         <p:txBody>
@@ -19608,33 +19732,119 @@
                   <a:schemeClr val="tx1"/>
                 </a:solidFill>
               </a:rPr>
-              <a:t>Photo layout 1</a:t>
+              <a:t>Example of a bulleted slide with a subhead</a:t>
+            </a:r>
+          </a:p>
+          <a:p>
+            <a:pPr lvl="1"/>
+            <a:r>
+              <a:rPr lang="en-US" dirty="0">
+                <a:solidFill>
+                  <a:schemeClr val="tx1"/>
+                </a:solidFill>
+              </a:rPr>
+              <a:t>Set the slide title to “Sentence case”</a:t>
+            </a:r>
+          </a:p>
+          <a:p>
+            <a:pPr lvl="1"/>
+            <a:r>
+              <a:rPr lang="en-US" dirty="0">
+                <a:solidFill>
+                  <a:schemeClr val="tx1"/>
+                </a:solidFill>
+              </a:rPr>
+              <a:t>Set subheads to “Sentence case”</a:t>
+            </a:r>
+          </a:p>
+          <a:p>
+            <a:pPr lvl="0"/>
+            <a:r>
+              <a:rPr lang="en-US" dirty="0">
+                <a:solidFill>
+                  <a:schemeClr val="tx1"/>
+                </a:solidFill>
+              </a:rPr>
+              <a:t>Hyperlink style</a:t>
+            </a:r>
+          </a:p>
+          <a:p>
+            <a:pPr lvl="1"/>
+            <a:r>
+              <a:rPr lang="en-US" dirty="0">
+                <a:solidFill>
+                  <a:schemeClr val="tx1"/>
+                </a:solidFill>
+                <a:hlinkClick r:id="rId3"/>
+              </a:rPr>
+              <a:t>www.microsoft.com</a:t>
+            </a:r>
+            <a:r>
+              <a:rPr lang="en-US" dirty="0">
+                <a:solidFill>
+                  <a:schemeClr val="tx1"/>
+                </a:solidFill>
+              </a:rPr>
+              <a:t> </a:t>
             </a:r>
           </a:p>
         </p:txBody>
       </p:sp>
       <p:sp>
         <p:nvSpPr>
-          <p:cNvPr id="3" name="Picture Placeholder 2">
-            <a:extLst>
-              <a:ext uri="{FF2B5EF4-FFF2-40B4-BE49-F238E27FC236}">
-                <a16:creationId xmlns:a16="http://schemas.microsoft.com/office/drawing/2014/main" id="{1C1F0CEC-E709-49D5-9437-71B581E4C3E3}"/>
-              </a:ext>
-            </a:extLst>
-          </p:cNvPr>
+          <p:cNvPr id="2" name="Title 1"/>
           <p:cNvSpPr>
             <a:spLocks noGrp="1"/>
           </p:cNvSpPr>
           <p:nvPr>
-            <p:ph type="pic" sz="quarter" idx="10"/>
+            <p:ph type="title" idx="4294967295"/>
           </p:nvPr>
         </p:nvSpPr>
-        <p:spPr/>
+        <p:spPr>
+          <a:xfrm>
+            <a:off x="534988" y="290513"/>
+            <a:ext cx="11657012" cy="900112"/>
+          </a:xfrm>
+        </p:spPr>
+        <p:txBody>
+          <a:bodyPr/>
+          <a:lstStyle/>
+          <a:p>
+            <a:r>
+              <a:rPr lang="en-US" dirty="0">
+                <a:solidFill>
+                  <a:schemeClr val="tx1"/>
+                </a:solidFill>
+              </a:rPr>
+              <a:t>Bullet points layout with subtitle</a:t>
+            </a:r>
+            <a:br>
+              <a:rPr lang="en-US" dirty="0">
+                <a:solidFill>
+                  <a:schemeClr val="tx1"/>
+                </a:solidFill>
+              </a:rPr>
+            </a:br>
+            <a:r>
+              <a:rPr lang="en-US" sz="3529" dirty="0">
+                <a:solidFill>
+                  <a:schemeClr val="tx1"/>
+                </a:solidFill>
+              </a:rPr>
+              <a:t>Subtitle is smaller in the same text block</a:t>
+            </a:r>
+            <a:endParaRPr lang="en-US" sz="3921" dirty="0">
+              <a:solidFill>
+                <a:schemeClr val="tx1"/>
+              </a:solidFill>
+            </a:endParaRPr>
+          </a:p>
+        </p:txBody>
       </p:sp>
     </p:spTree>
     <p:extLst>
       <p:ext uri="{BB962C8B-B14F-4D97-AF65-F5344CB8AC3E}">
-        <p14:creationId xmlns:p14="http://schemas.microsoft.com/office/powerpoint/2010/main" val="491487794"/>
+        <p14:creationId xmlns:p14="http://schemas.microsoft.com/office/powerpoint/2010/main" val="3887587415"/>
       </p:ext>
     </p:extLst>
   </p:cSld>
@@ -19675,7 +19885,7 @@
       </p:grpSpPr>
       <p:sp>
         <p:nvSpPr>
-          <p:cNvPr id="3" name="Title 2"/>
+          <p:cNvPr id="2" name="Title 1"/>
           <p:cNvSpPr>
             <a:spLocks noGrp="1"/>
           </p:cNvSpPr>
@@ -19683,7 +19893,12 @@
             <p:ph type="title"/>
           </p:nvPr>
         </p:nvSpPr>
-        <p:spPr/>
+        <p:spPr>
+          <a:xfrm>
+            <a:off x="269240" y="3010840"/>
+            <a:ext cx="4795873" cy="836319"/>
+          </a:xfrm>
+        </p:spPr>
         <p:txBody>
           <a:bodyPr/>
           <a:lstStyle/>
@@ -19694,15 +19909,33 @@
                   <a:schemeClr val="tx1"/>
                 </a:solidFill>
               </a:rPr>
-              <a:t>Demo</a:t>
+              <a:t>Photo layout 1</a:t>
             </a:r>
           </a:p>
         </p:txBody>
+      </p:sp>
+      <p:sp>
+        <p:nvSpPr>
+          <p:cNvPr id="3" name="Picture Placeholder 2">
+            <a:extLst>
+              <a:ext uri="{FF2B5EF4-FFF2-40B4-BE49-F238E27FC236}">
+                <a16:creationId xmlns:a16="http://schemas.microsoft.com/office/drawing/2014/main" id="{1C1F0CEC-E709-49D5-9437-71B581E4C3E3}"/>
+              </a:ext>
+            </a:extLst>
+          </p:cNvPr>
+          <p:cNvSpPr>
+            <a:spLocks noGrp="1"/>
+          </p:cNvSpPr>
+          <p:nvPr>
+            <p:ph type="pic" sz="quarter" idx="10"/>
+          </p:nvPr>
+        </p:nvSpPr>
+        <p:spPr/>
       </p:sp>
     </p:spTree>
     <p:extLst>
       <p:ext uri="{BB962C8B-B14F-4D97-AF65-F5344CB8AC3E}">
-        <p14:creationId xmlns:p14="http://schemas.microsoft.com/office/powerpoint/2010/main" val="4151172388"/>
+        <p14:creationId xmlns:p14="http://schemas.microsoft.com/office/powerpoint/2010/main" val="491487794"/>
       </p:ext>
     </p:extLst>
   </p:cSld>
@@ -19743,7 +19976,7 @@
       </p:grpSpPr>
       <p:sp>
         <p:nvSpPr>
-          <p:cNvPr id="4" name="Title 3"/>
+          <p:cNvPr id="3" name="Title 2"/>
           <p:cNvSpPr>
             <a:spLocks noGrp="1"/>
           </p:cNvSpPr>
@@ -19757,8 +19990,12 @@
           <a:lstStyle/>
           <a:p>
             <a:r>
-              <a:rPr lang="en-US" dirty="0"/>
-              <a:t>Video</a:t>
+              <a:rPr lang="en-US" dirty="0">
+                <a:solidFill>
+                  <a:schemeClr val="tx1"/>
+                </a:solidFill>
+              </a:rPr>
+              <a:t>Demo</a:t>
             </a:r>
           </a:p>
         </p:txBody>
@@ -19766,7 +20003,7 @@
     </p:spTree>
     <p:extLst>
       <p:ext uri="{BB962C8B-B14F-4D97-AF65-F5344CB8AC3E}">
-        <p14:creationId xmlns:p14="http://schemas.microsoft.com/office/powerpoint/2010/main" val="1702666910"/>
+        <p14:creationId xmlns:p14="http://schemas.microsoft.com/office/powerpoint/2010/main" val="4151172388"/>
       </p:ext>
     </p:extLst>
   </p:cSld>
@@ -19807,7 +20044,7 @@
       </p:grpSpPr>
       <p:sp>
         <p:nvSpPr>
-          <p:cNvPr id="2" name="Title 1"/>
+          <p:cNvPr id="4" name="Title 3"/>
           <p:cNvSpPr>
             <a:spLocks noGrp="1"/>
           </p:cNvSpPr>
@@ -19821,12 +20058,8 @@
           <a:lstStyle/>
           <a:p>
             <a:r>
-              <a:rPr lang="en-US" dirty="0">
-                <a:solidFill>
-                  <a:schemeClr val="tx1"/>
-                </a:solidFill>
-              </a:rPr>
-              <a:t>Section title</a:t>
+              <a:rPr lang="en-US" dirty="0"/>
+              <a:t>Video</a:t>
             </a:r>
           </a:p>
         </p:txBody>
@@ -19834,7 +20067,7 @@
     </p:spTree>
     <p:extLst>
       <p:ext uri="{BB962C8B-B14F-4D97-AF65-F5344CB8AC3E}">
-        <p14:creationId xmlns:p14="http://schemas.microsoft.com/office/powerpoint/2010/main" val="1666887711"/>
+        <p14:creationId xmlns:p14="http://schemas.microsoft.com/office/powerpoint/2010/main" val="1702666910"/>
       </p:ext>
     </p:extLst>
   </p:cSld>
@@ -19875,6 +20108,74 @@
       </p:grpSpPr>
       <p:sp>
         <p:nvSpPr>
+          <p:cNvPr id="2" name="Title 1"/>
+          <p:cNvSpPr>
+            <a:spLocks noGrp="1"/>
+          </p:cNvSpPr>
+          <p:nvPr>
+            <p:ph type="title"/>
+          </p:nvPr>
+        </p:nvSpPr>
+        <p:spPr/>
+        <p:txBody>
+          <a:bodyPr/>
+          <a:lstStyle/>
+          <a:p>
+            <a:r>
+              <a:rPr lang="en-US" dirty="0">
+                <a:solidFill>
+                  <a:schemeClr val="tx1"/>
+                </a:solidFill>
+              </a:rPr>
+              <a:t>Section title</a:t>
+            </a:r>
+          </a:p>
+        </p:txBody>
+      </p:sp>
+    </p:spTree>
+    <p:extLst>
+      <p:ext uri="{BB962C8B-B14F-4D97-AF65-F5344CB8AC3E}">
+        <p14:creationId xmlns:p14="http://schemas.microsoft.com/office/powerpoint/2010/main" val="1666887711"/>
+      </p:ext>
+    </p:extLst>
+  </p:cSld>
+  <p:clrMapOvr>
+    <a:masterClrMapping/>
+  </p:clrMapOvr>
+  <mc:AlternateContent xmlns:mc="http://schemas.openxmlformats.org/markup-compatibility/2006" xmlns:p14="http://schemas.microsoft.com/office/powerpoint/2010/main">
+    <mc:Choice Requires="p14">
+      <p:transition spd="med" p14:dur="700">
+        <p:fade/>
+      </p:transition>
+    </mc:Choice>
+    <mc:Fallback xmlns="">
+      <p:transition spd="med">
+        <p:fade/>
+      </p:transition>
+    </mc:Fallback>
+  </mc:AlternateContent>
+</p:sld>
+</file>
+
+<file path=ppt/slides/slide27.xml><?xml version="1.0" encoding="utf-8"?>
+<p:sld xmlns:a="http://schemas.openxmlformats.org/drawingml/2006/main" xmlns:r="http://schemas.openxmlformats.org/officeDocument/2006/relationships" xmlns:p="http://schemas.openxmlformats.org/presentationml/2006/main">
+  <p:cSld>
+    <p:spTree>
+      <p:nvGrpSpPr>
+        <p:cNvPr id="1" name=""/>
+        <p:cNvGrpSpPr/>
+        <p:nvPr/>
+      </p:nvGrpSpPr>
+      <p:grpSpPr>
+        <a:xfrm>
+          <a:off x="0" y="0"/>
+          <a:ext cx="0" cy="0"/>
+          <a:chOff x="0" y="0"/>
+          <a:chExt cx="0" cy="0"/>
+        </a:xfrm>
+      </p:grpSpPr>
+      <p:sp>
+        <p:nvSpPr>
           <p:cNvPr id="4" name="Title 3"/>
           <p:cNvSpPr>
             <a:spLocks noGrp="1"/>
@@ -19942,7 +20243,7 @@
 </p:sld>
 </file>
 
-<file path=ppt/slides/slide27.xml><?xml version="1.0" encoding="utf-8"?>
+<file path=ppt/slides/slide28.xml><?xml version="1.0" encoding="utf-8"?>
 <p:sld xmlns:a="http://schemas.openxmlformats.org/drawingml/2006/main" xmlns:r="http://schemas.openxmlformats.org/officeDocument/2006/relationships" xmlns:p="http://schemas.openxmlformats.org/presentationml/2006/main">
   <p:cSld>
     <p:spTree>
@@ -20624,23 +20925,7 @@
           <a:p>
             <a:r>
               <a:rPr lang="en-US" sz="3600" dirty="0"/>
-              <a:t>They need to </a:t>
-            </a:r>
-            <a:r>
-              <a:rPr lang="en-US" sz="3600"/>
-              <a:t>ingest sensor </a:t>
-            </a:r>
-            <a:r>
-              <a:rPr lang="en-US" sz="3600" dirty="0"/>
-              <a:t>data in near real time to allow them to quickly identify patterns that can be shared </a:t>
-            </a:r>
-            <a:r>
-              <a:rPr lang="en-US" sz="3600"/>
-              <a:t>between stores in an aim </a:t>
-            </a:r>
-            <a:r>
-              <a:rPr lang="en-US" sz="3600" dirty="0"/>
-              <a:t>to improve sales with last minute offers and improved product placement.</a:t>
+              <a:t>They need to ingest sensor data in near real time to allow them to quickly identify patterns that can be shared between stores in an aim to improve sales with last minute offers and improved product placement.</a:t>
             </a:r>
           </a:p>
         </p:txBody>
@@ -20808,7 +21093,13 @@
       </p:grpSpPr>
       <p:sp>
         <p:nvSpPr>
-          <p:cNvPr id="3" name="Content Placeholder 2"/>
+          <p:cNvPr id="2" name="Text Placeholder 1">
+            <a:extLst>
+              <a:ext uri="{FF2B5EF4-FFF2-40B4-BE49-F238E27FC236}">
+                <a16:creationId xmlns:a16="http://schemas.microsoft.com/office/drawing/2014/main" id="{70014F08-7FD5-45F1-B973-F4EB12097E59}"/>
+              </a:ext>
+            </a:extLst>
+          </p:cNvPr>
           <p:cNvSpPr>
             <a:spLocks noGrp="1"/>
           </p:cNvSpPr>
@@ -20816,103 +21107,38 @@
             <p:ph type="body" sz="quarter" idx="10"/>
           </p:nvPr>
         </p:nvSpPr>
-        <p:spPr/>
+        <p:spPr>
+          <a:xfrm>
+            <a:off x="269240" y="1189177"/>
+            <a:ext cx="8605820" cy="3563540"/>
+          </a:xfrm>
+        </p:spPr>
         <p:txBody>
-          <a:bodyPr>
-            <a:normAutofit fontScale="92500" lnSpcReduction="10000"/>
-          </a:bodyPr>
+          <a:bodyPr/>
           <a:lstStyle/>
           <a:p>
             <a:r>
-              <a:rPr lang="en-US" sz="3600" dirty="0">
-                <a:solidFill>
-                  <a:schemeClr val="tx1"/>
-                </a:solidFill>
-                <a:latin typeface="+mj-lt"/>
-              </a:rPr>
-              <a:t>Main topic 1: size 36pt</a:t>
-            </a:r>
-          </a:p>
-          <a:p>
-            <a:pPr lvl="1"/>
-            <a:r>
-              <a:rPr lang="en-US" sz="2800" dirty="0">
-                <a:solidFill>
-                  <a:schemeClr val="tx1"/>
-                </a:solidFill>
-                <a:latin typeface="Segoe UI Semilight" panose="020B0402040204020203" pitchFamily="34" charset="0"/>
-                <a:cs typeface="Segoe UI Semilight" panose="020B0402040204020203" pitchFamily="34" charset="0"/>
-              </a:rPr>
-              <a:t>Size 28pt for second leve</a:t>
-            </a:r>
-            <a:r>
-              <a:rPr lang="en-US" sz="2400" dirty="0">
-                <a:solidFill>
-                  <a:schemeClr val="tx1"/>
-                </a:solidFill>
-                <a:latin typeface="Segoe UI Semilight" panose="020B0402040204020203" pitchFamily="34" charset="0"/>
-                <a:cs typeface="Segoe UI Semilight" panose="020B0402040204020203" pitchFamily="34" charset="0"/>
-              </a:rPr>
-              <a:t>l</a:t>
-            </a:r>
-          </a:p>
-          <a:p>
-            <a:pPr lvl="1"/>
-            <a:r>
-              <a:rPr lang="en-US" sz="2400" dirty="0">
-                <a:solidFill>
-                  <a:schemeClr val="tx1"/>
-                </a:solidFill>
-                <a:latin typeface="Segoe UI Semilight" panose="020B0402040204020203" pitchFamily="34" charset="0"/>
-                <a:cs typeface="Segoe UI Semilight" panose="020B0402040204020203" pitchFamily="34" charset="0"/>
-              </a:rPr>
-              <a:t>Size 24pt for third level</a:t>
-            </a:r>
-          </a:p>
-          <a:p>
-            <a:pPr lvl="1"/>
-            <a:r>
-              <a:rPr lang="en-US" sz="2200" dirty="0">
-                <a:solidFill>
-                  <a:schemeClr val="tx1"/>
-                </a:solidFill>
-                <a:latin typeface="Segoe UI Semilight" panose="020B0402040204020203" pitchFamily="34" charset="0"/>
-                <a:cs typeface="Segoe UI Semilight" panose="020B0402040204020203" pitchFamily="34" charset="0"/>
-              </a:rPr>
-              <a:t>Size 22pt for fourth level</a:t>
-            </a:r>
-          </a:p>
-          <a:p>
-            <a:pPr lvl="1"/>
-            <a:r>
-              <a:rPr lang="en-US" sz="2200" dirty="0">
-                <a:solidFill>
-                  <a:schemeClr val="tx1"/>
-                </a:solidFill>
-                <a:latin typeface="Segoe UI Semilight" panose="020B0402040204020203" pitchFamily="34" charset="0"/>
-                <a:cs typeface="Segoe UI Semilight" panose="020B0402040204020203" pitchFamily="34" charset="0"/>
-              </a:rPr>
-              <a:t>Size 22pt for fifth level</a:t>
-            </a:r>
-          </a:p>
-          <a:p>
-            <a:pPr marL="0" indent="0">
-              <a:spcAft>
-                <a:spcPts val="882"/>
-              </a:spcAft>
-              <a:buNone/>
-            </a:pPr>
-            <a:endParaRPr lang="en-US" sz="1800" dirty="0">
-              <a:solidFill>
-                <a:schemeClr val="tx1"/>
-              </a:solidFill>
-            </a:endParaRPr>
+              <a:rPr lang="en-US" dirty="0"/>
+              <a:t>To bring their entire operation into perspective, WWI would like to create a dashboard where they can see their KPIs derived from historical data, and near real-time data streams. </a:t>
+            </a:r>
+          </a:p>
+          <a:p>
+            <a:r>
+              <a:rPr lang="en-US" dirty="0"/>
+              <a:t>They want to make key product recommendations generated with the help of machine learning models.</a:t>
+            </a:r>
           </a:p>
         </p:txBody>
       </p:sp>
       <p:sp>
         <p:nvSpPr>
-          <p:cNvPr id="2" name="Title 1"/>
+          <p:cNvPr id="3" name="Title 2">
+            <a:extLst>
+              <a:ext uri="{FF2B5EF4-FFF2-40B4-BE49-F238E27FC236}">
+                <a16:creationId xmlns:a16="http://schemas.microsoft.com/office/drawing/2014/main" id="{4D984DA0-6E05-4483-9781-6661D38DA8DA}"/>
+              </a:ext>
+            </a:extLst>
+          </p:cNvPr>
           <p:cNvSpPr>
             <a:spLocks noGrp="1"/>
           </p:cNvSpPr>
@@ -20922,55 +21148,29 @@
         </p:nvSpPr>
         <p:spPr/>
         <p:txBody>
-          <a:bodyPr>
-            <a:normAutofit fontScale="90000"/>
-          </a:bodyPr>
+          <a:bodyPr/>
           <a:lstStyle/>
           <a:p>
             <a:r>
-              <a:rPr lang="en-US" sz="4900" dirty="0">
-                <a:solidFill>
-                  <a:schemeClr val="tx1"/>
-                </a:solidFill>
-                <a:cs typeface="Segoe UI" panose="020B0502040204020203" pitchFamily="34" charset="0"/>
-              </a:rPr>
-              <a:t>Customer needs</a:t>
-            </a:r>
-            <a:br>
-              <a:rPr lang="en-US" dirty="0">
-                <a:solidFill>
-                  <a:schemeClr val="tx1"/>
-                </a:solidFill>
-                <a:latin typeface="Segoe UI" panose="020B0502040204020203" pitchFamily="34" charset="0"/>
-              </a:rPr>
-            </a:br>
-            <a:endParaRPr lang="en-US" sz="3236" dirty="0">
-              <a:solidFill>
-                <a:schemeClr val="tx1"/>
-              </a:solidFill>
-              <a:latin typeface="Segoe UI" panose="020B0502040204020203" pitchFamily="34" charset="0"/>
-            </a:endParaRPr>
+              <a:rPr lang="en-US" dirty="0"/>
+              <a:t>Customer Situation - 6</a:t>
+            </a:r>
           </a:p>
         </p:txBody>
       </p:sp>
     </p:spTree>
     <p:extLst>
       <p:ext uri="{BB962C8B-B14F-4D97-AF65-F5344CB8AC3E}">
-        <p14:creationId xmlns:p14="http://schemas.microsoft.com/office/powerpoint/2010/main" val="3923265977"/>
+        <p14:creationId xmlns:p14="http://schemas.microsoft.com/office/powerpoint/2010/main" val="2732402372"/>
       </p:ext>
     </p:extLst>
   </p:cSld>
   <p:clrMapOvr>
     <a:masterClrMapping/>
   </p:clrMapOvr>
-  <mc:AlternateContent xmlns:mc="http://schemas.openxmlformats.org/markup-compatibility/2006" xmlns:p14="http://schemas.microsoft.com/office/powerpoint/2010/main">
-    <mc:Choice Requires="p14">
-      <p:transition p14:dur="0"/>
-    </mc:Choice>
-    <mc:Fallback xmlns="">
-      <p:transition/>
-    </mc:Fallback>
-  </mc:AlternateContent>
+  <p:transition>
+    <p:fade/>
+  </p:transition>
 </p:sld>
 </file>
 
@@ -21119,7 +21319,7 @@
                 </a:solidFill>
                 <a:cs typeface="Segoe UI" panose="020B0502040204020203" pitchFamily="34" charset="0"/>
               </a:rPr>
-              <a:t>Customer objections</a:t>
+              <a:t>Customer needs</a:t>
             </a:r>
             <a:br>
               <a:rPr lang="en-US" dirty="0">
@@ -21141,7 +21341,7 @@
     </p:spTree>
     <p:extLst>
       <p:ext uri="{BB962C8B-B14F-4D97-AF65-F5344CB8AC3E}">
-        <p14:creationId xmlns:p14="http://schemas.microsoft.com/office/powerpoint/2010/main" val="601339970"/>
+        <p14:creationId xmlns:p14="http://schemas.microsoft.com/office/powerpoint/2010/main" val="3923265977"/>
       </p:ext>
     </p:extLst>
   </p:cSld>

</xml_diff>